<commit_message>
added palpatine meme to cli slides
</commit_message>
<xml_diff>
--- a/2018/misc/CLI Git.pptx
+++ b/2018/misc/CLI Git.pptx
@@ -12,17 +12,18 @@
     <p:sldId id="261" r:id="rId6"/>
     <p:sldId id="263" r:id="rId7"/>
     <p:sldId id="268" r:id="rId8"/>
-    <p:sldId id="264" r:id="rId9"/>
-    <p:sldId id="269" r:id="rId10"/>
-    <p:sldId id="271" r:id="rId11"/>
-    <p:sldId id="273" r:id="rId12"/>
-    <p:sldId id="274" r:id="rId13"/>
-    <p:sldId id="272" r:id="rId14"/>
-    <p:sldId id="275" r:id="rId15"/>
-    <p:sldId id="277" r:id="rId16"/>
-    <p:sldId id="278" r:id="rId17"/>
-    <p:sldId id="279" r:id="rId18"/>
-    <p:sldId id="281" r:id="rId19"/>
+    <p:sldId id="282" r:id="rId9"/>
+    <p:sldId id="264" r:id="rId10"/>
+    <p:sldId id="269" r:id="rId11"/>
+    <p:sldId id="271" r:id="rId12"/>
+    <p:sldId id="273" r:id="rId13"/>
+    <p:sldId id="274" r:id="rId14"/>
+    <p:sldId id="272" r:id="rId15"/>
+    <p:sldId id="275" r:id="rId16"/>
+    <p:sldId id="277" r:id="rId17"/>
+    <p:sldId id="278" r:id="rId18"/>
+    <p:sldId id="279" r:id="rId19"/>
+    <p:sldId id="281" r:id="rId20"/>
   </p:sldIdLst>
   <p:sldSz cx="12192000" cy="6858000"/>
   <p:notesSz cx="6858000" cy="9144000"/>
@@ -286,7 +287,7 @@
           <a:p>
             <a:fld id="{F4EAFB54-7980-41A8-B151-9D25B292734F}" type="datetimeFigureOut">
               <a:rPr lang="en-US" smtClean="0"/>
-              <a:t>6/1/2018</a:t>
+              <a:t>6/3/2018</a:t>
             </a:fld>
             <a:endParaRPr lang="en-US"/>
           </a:p>
@@ -456,7 +457,7 @@
           <a:p>
             <a:fld id="{F4EAFB54-7980-41A8-B151-9D25B292734F}" type="datetimeFigureOut">
               <a:rPr lang="en-US" smtClean="0"/>
-              <a:t>6/1/2018</a:t>
+              <a:t>6/3/2018</a:t>
             </a:fld>
             <a:endParaRPr lang="en-US"/>
           </a:p>
@@ -636,7 +637,7 @@
           <a:p>
             <a:fld id="{F4EAFB54-7980-41A8-B151-9D25B292734F}" type="datetimeFigureOut">
               <a:rPr lang="en-US" smtClean="0"/>
-              <a:t>6/1/2018</a:t>
+              <a:t>6/3/2018</a:t>
             </a:fld>
             <a:endParaRPr lang="en-US"/>
           </a:p>
@@ -806,7 +807,7 @@
           <a:p>
             <a:fld id="{F4EAFB54-7980-41A8-B151-9D25B292734F}" type="datetimeFigureOut">
               <a:rPr lang="en-US" smtClean="0"/>
-              <a:t>6/1/2018</a:t>
+              <a:t>6/3/2018</a:t>
             </a:fld>
             <a:endParaRPr lang="en-US"/>
           </a:p>
@@ -1052,7 +1053,7 @@
           <a:p>
             <a:fld id="{F4EAFB54-7980-41A8-B151-9D25B292734F}" type="datetimeFigureOut">
               <a:rPr lang="en-US" smtClean="0"/>
-              <a:t>6/1/2018</a:t>
+              <a:t>6/3/2018</a:t>
             </a:fld>
             <a:endParaRPr lang="en-US"/>
           </a:p>
@@ -1284,7 +1285,7 @@
           <a:p>
             <a:fld id="{F4EAFB54-7980-41A8-B151-9D25B292734F}" type="datetimeFigureOut">
               <a:rPr lang="en-US" smtClean="0"/>
-              <a:t>6/1/2018</a:t>
+              <a:t>6/3/2018</a:t>
             </a:fld>
             <a:endParaRPr lang="en-US"/>
           </a:p>
@@ -1651,7 +1652,7 @@
           <a:p>
             <a:fld id="{F4EAFB54-7980-41A8-B151-9D25B292734F}" type="datetimeFigureOut">
               <a:rPr lang="en-US" smtClean="0"/>
-              <a:t>6/1/2018</a:t>
+              <a:t>6/3/2018</a:t>
             </a:fld>
             <a:endParaRPr lang="en-US"/>
           </a:p>
@@ -1769,7 +1770,7 @@
           <a:p>
             <a:fld id="{F4EAFB54-7980-41A8-B151-9D25B292734F}" type="datetimeFigureOut">
               <a:rPr lang="en-US" smtClean="0"/>
-              <a:t>6/1/2018</a:t>
+              <a:t>6/3/2018</a:t>
             </a:fld>
             <a:endParaRPr lang="en-US"/>
           </a:p>
@@ -1864,7 +1865,7 @@
           <a:p>
             <a:fld id="{F4EAFB54-7980-41A8-B151-9D25B292734F}" type="datetimeFigureOut">
               <a:rPr lang="en-US" smtClean="0"/>
-              <a:t>6/1/2018</a:t>
+              <a:t>6/3/2018</a:t>
             </a:fld>
             <a:endParaRPr lang="en-US"/>
           </a:p>
@@ -2141,7 +2142,7 @@
           <a:p>
             <a:fld id="{F4EAFB54-7980-41A8-B151-9D25B292734F}" type="datetimeFigureOut">
               <a:rPr lang="en-US" smtClean="0"/>
-              <a:t>6/1/2018</a:t>
+              <a:t>6/3/2018</a:t>
             </a:fld>
             <a:endParaRPr lang="en-US"/>
           </a:p>
@@ -2394,7 +2395,7 @@
           <a:p>
             <a:fld id="{F4EAFB54-7980-41A8-B151-9D25B292734F}" type="datetimeFigureOut">
               <a:rPr lang="en-US" smtClean="0"/>
-              <a:t>6/1/2018</a:t>
+              <a:t>6/3/2018</a:t>
             </a:fld>
             <a:endParaRPr lang="en-US"/>
           </a:p>
@@ -2607,7 +2608,7 @@
           <a:p>
             <a:fld id="{F4EAFB54-7980-41A8-B151-9D25B292734F}" type="datetimeFigureOut">
               <a:rPr lang="en-US" smtClean="0"/>
-              <a:t>6/1/2018</a:t>
+              <a:t>6/3/2018</a:t>
             </a:fld>
             <a:endParaRPr lang="en-US"/>
           </a:p>
@@ -3029,11 +3030,7 @@
           <a:p>
             <a:r>
               <a:rPr lang="en-US" dirty="0" smtClean="0"/>
-              <a:t>Introduction to </a:t>
-            </a:r>
-            <a:r>
-              <a:rPr lang="en-US" dirty="0" smtClean="0"/>
-              <a:t>CLI</a:t>
+              <a:t>Introduction to CLI</a:t>
             </a:r>
             <a:endParaRPr lang="en-US" dirty="0"/>
           </a:p>
@@ -3101,7 +3098,7 @@
             <a:spLocks noGrp="1"/>
           </p:cNvSpPr>
           <p:nvPr>
-            <p:ph type="title"/>
+            <p:ph type="ctrTitle"/>
           </p:nvPr>
         </p:nvSpPr>
         <p:spPr/>
@@ -3109,10 +3106,13 @@
           <a:bodyPr/>
           <a:lstStyle/>
           <a:p>
-            <a:pPr algn="ctr"/>
             <a:r>
               <a:rPr lang="en-US" dirty="0" smtClean="0"/>
-              <a:t>Version Controlling</a:t>
+              <a:t>Introduction to </a:t>
+            </a:r>
+            <a:r>
+              <a:rPr lang="en-US" dirty="0" err="1" smtClean="0"/>
+              <a:t>Git</a:t>
             </a:r>
             <a:endParaRPr lang="en-US" dirty="0"/>
           </a:p>
@@ -3120,53 +3120,33 @@
       </p:sp>
       <p:sp>
         <p:nvSpPr>
-          <p:cNvPr id="3" name="Content Placeholder 2"/>
-          <p:cNvSpPr>
-            <a:spLocks noGrp="1"/>
-          </p:cNvSpPr>
-          <p:nvPr>
-            <p:ph idx="1"/>
+          <p:cNvPr id="3" name="Subtitle 2"/>
+          <p:cNvSpPr>
+            <a:spLocks noGrp="1"/>
+          </p:cNvSpPr>
+          <p:nvPr>
+            <p:ph type="subTitle" idx="1"/>
           </p:nvPr>
         </p:nvSpPr>
         <p:spPr/>
         <p:txBody>
-          <a:bodyPr>
-            <a:normAutofit/>
-          </a:bodyPr>
-          <a:lstStyle/>
-          <a:p>
-            <a:r>
-              <a:rPr lang="en-US" sz="3600" dirty="0" smtClean="0"/>
-              <a:t>Save TONS of different versions of project over time.</a:t>
-            </a:r>
-          </a:p>
-          <a:p>
-            <a:r>
-              <a:rPr lang="en-US" sz="3600" dirty="0" smtClean="0"/>
-              <a:t>Can recover ANY of those iterations.</a:t>
-            </a:r>
-          </a:p>
-          <a:p>
-            <a:r>
-              <a:rPr lang="en-US" sz="3600" dirty="0" smtClean="0"/>
-              <a:t>Nothing is ever lost.</a:t>
-            </a:r>
-          </a:p>
-          <a:p>
-            <a:r>
-              <a:rPr lang="en-US" sz="3600" dirty="0" smtClean="0"/>
-              <a:t>The date, time, and extent of every change is logged (so is the person who made the changes).</a:t>
-            </a:r>
-          </a:p>
-          <a:p>
-            <a:endParaRPr lang="en-US" sz="3600" dirty="0"/>
+          <a:bodyPr/>
+          <a:lstStyle/>
+          <a:p>
+            <a:r>
+              <a:rPr lang="en-US" dirty="0" smtClean="0"/>
+              <a:t>HILT 2018</a:t>
+            </a:r>
+          </a:p>
+          <a:p>
+            <a:endParaRPr lang="en-US" dirty="0"/>
           </a:p>
         </p:txBody>
       </p:sp>
     </p:spTree>
     <p:extLst>
       <p:ext uri="{BB962C8B-B14F-4D97-AF65-F5344CB8AC3E}">
-        <p14:creationId xmlns:p14="http://schemas.microsoft.com/office/powerpoint/2010/main" val="2341958008"/>
+        <p14:creationId xmlns:p14="http://schemas.microsoft.com/office/powerpoint/2010/main" val="4066827190"/>
       </p:ext>
     </p:extLst>
   </p:cSld>
@@ -3193,68 +3173,79 @@
           <a:chExt cx="0" cy="0"/>
         </a:xfrm>
       </p:grpSpPr>
-      <p:pic>
-        <p:nvPicPr>
-          <p:cNvPr id="4" name="Content Placeholder 3"/>
-          <p:cNvPicPr>
-            <a:picLocks noGrp="1" noChangeAspect="1"/>
-          </p:cNvPicPr>
+      <p:sp>
+        <p:nvSpPr>
+          <p:cNvPr id="2" name="Title 1"/>
+          <p:cNvSpPr>
+            <a:spLocks noGrp="1"/>
+          </p:cNvSpPr>
+          <p:nvPr>
+            <p:ph type="title"/>
+          </p:nvPr>
+        </p:nvSpPr>
+        <p:spPr/>
+        <p:txBody>
+          <a:bodyPr/>
+          <a:lstStyle/>
+          <a:p>
+            <a:pPr algn="ctr"/>
+            <a:r>
+              <a:rPr lang="en-US" dirty="0" smtClean="0"/>
+              <a:t>Version Controlling</a:t>
+            </a:r>
+            <a:endParaRPr lang="en-US" dirty="0"/>
+          </a:p>
+        </p:txBody>
+      </p:sp>
+      <p:sp>
+        <p:nvSpPr>
+          <p:cNvPr id="3" name="Content Placeholder 2"/>
+          <p:cNvSpPr>
+            <a:spLocks noGrp="1"/>
+          </p:cNvSpPr>
           <p:nvPr>
             <p:ph idx="1"/>
           </p:nvPr>
-        </p:nvPicPr>
-        <p:blipFill rotWithShape="1">
-          <a:blip r:embed="rId2">
-            <a:extLst>
-              <a:ext uri="{28A0092B-C50C-407E-A947-70E740481C1C}">
-                <a14:useLocalDpi xmlns:a14="http://schemas.microsoft.com/office/drawing/2010/main" val="0"/>
-              </a:ext>
-            </a:extLst>
-          </a:blip>
-          <a:srcRect l="15581" t="12063" r="8680"/>
-          <a:stretch/>
-        </p:blipFill>
-        <p:spPr>
-          <a:xfrm>
-            <a:off x="3206906" y="172681"/>
-            <a:ext cx="7895755" cy="6574383"/>
-          </a:xfrm>
-        </p:spPr>
-      </p:pic>
-      <p:sp>
-        <p:nvSpPr>
-          <p:cNvPr id="2" name="TextBox 1"/>
-          <p:cNvSpPr txBox="1"/>
-          <p:nvPr/>
-        </p:nvSpPr>
-        <p:spPr>
-          <a:xfrm>
-            <a:off x="1505384" y="2422358"/>
-            <a:ext cx="827471" cy="1446550"/>
-          </a:xfrm>
-          <a:prstGeom prst="rect">
-            <a:avLst/>
-          </a:prstGeom>
-          <a:noFill/>
-        </p:spPr>
-        <p:txBody>
-          <a:bodyPr wrap="none" rtlCol="0">
-            <a:spAutoFit/>
+        </p:nvSpPr>
+        <p:spPr/>
+        <p:txBody>
+          <a:bodyPr>
+            <a:normAutofit/>
           </a:bodyPr>
           <a:lstStyle/>
           <a:p>
             <a:r>
-              <a:rPr lang="en-US" sz="8800" dirty="0" smtClean="0"/>
-              <a:t>:(</a:t>
-            </a:r>
-            <a:endParaRPr lang="en-US" sz="8800" dirty="0"/>
+              <a:rPr lang="en-US" sz="3600" dirty="0" smtClean="0"/>
+              <a:t>Save TONS of different versions of project over time.</a:t>
+            </a:r>
+          </a:p>
+          <a:p>
+            <a:r>
+              <a:rPr lang="en-US" sz="3600" dirty="0" smtClean="0"/>
+              <a:t>Can recover ANY of those iterations.</a:t>
+            </a:r>
+          </a:p>
+          <a:p>
+            <a:r>
+              <a:rPr lang="en-US" sz="3600" dirty="0" smtClean="0"/>
+              <a:t>Nothing is ever lost.</a:t>
+            </a:r>
+          </a:p>
+          <a:p>
+            <a:r>
+              <a:rPr lang="en-US" sz="3600" dirty="0" smtClean="0"/>
+              <a:t>The date, time, and extent of every change is logged (so is the person who made the changes).</a:t>
+            </a:r>
+          </a:p>
+          <a:p>
+            <a:endParaRPr lang="en-US" sz="3600" dirty="0"/>
           </a:p>
         </p:txBody>
       </p:sp>
     </p:spTree>
     <p:extLst>
       <p:ext uri="{BB962C8B-B14F-4D97-AF65-F5344CB8AC3E}">
-        <p14:creationId xmlns:p14="http://schemas.microsoft.com/office/powerpoint/2010/main" val="1490363422"/>
+        <p14:creationId xmlns:p14="http://schemas.microsoft.com/office/powerpoint/2010/main" val="2341958008"/>
       </p:ext>
     </p:extLst>
   </p:cSld>
@@ -3291,7 +3282,7 @@
             <p:ph idx="1"/>
           </p:nvPr>
         </p:nvPicPr>
-        <p:blipFill>
+        <p:blipFill rotWithShape="1">
           <a:blip r:embed="rId2">
             <a:extLst>
               <a:ext uri="{28A0092B-C50C-407E-A947-70E740481C1C}">
@@ -3299,20 +3290,19 @@
               </a:ext>
             </a:extLst>
           </a:blip>
-          <a:stretch>
-            <a:fillRect/>
-          </a:stretch>
+          <a:srcRect l="15581" t="12063" r="8680"/>
+          <a:stretch/>
         </p:blipFill>
         <p:spPr>
           <a:xfrm>
-            <a:off x="3704883" y="105182"/>
-            <a:ext cx="6358600" cy="6571663"/>
+            <a:off x="3206906" y="172681"/>
+            <a:ext cx="7895755" cy="6574383"/>
           </a:xfrm>
         </p:spPr>
       </p:pic>
       <p:sp>
         <p:nvSpPr>
-          <p:cNvPr id="3" name="TextBox 2"/>
+          <p:cNvPr id="2" name="TextBox 1"/>
           <p:cNvSpPr txBox="1"/>
           <p:nvPr/>
         </p:nvSpPr>
@@ -3334,7 +3324,7 @@
           <a:p>
             <a:r>
               <a:rPr lang="en-US" sz="8800" dirty="0" smtClean="0"/>
-              <a:t>:)</a:t>
+              <a:t>:(</a:t>
             </a:r>
             <a:endParaRPr lang="en-US" sz="8800" dirty="0"/>
           </a:p>
@@ -3343,7 +3333,7 @@
     </p:spTree>
     <p:extLst>
       <p:ext uri="{BB962C8B-B14F-4D97-AF65-F5344CB8AC3E}">
-        <p14:creationId xmlns:p14="http://schemas.microsoft.com/office/powerpoint/2010/main" val="1151761814"/>
+        <p14:creationId xmlns:p14="http://schemas.microsoft.com/office/powerpoint/2010/main" val="1490363422"/>
       </p:ext>
     </p:extLst>
   </p:cSld>
@@ -3370,79 +3360,69 @@
           <a:chExt cx="0" cy="0"/>
         </a:xfrm>
       </p:grpSpPr>
-      <p:sp>
-        <p:nvSpPr>
-          <p:cNvPr id="2" name="Title 1"/>
-          <p:cNvSpPr>
-            <a:spLocks noGrp="1"/>
-          </p:cNvSpPr>
-          <p:nvPr>
-            <p:ph type="title"/>
-          </p:nvPr>
-        </p:nvSpPr>
-        <p:spPr/>
-        <p:txBody>
-          <a:bodyPr/>
-          <a:lstStyle/>
-          <a:p>
-            <a:pPr algn="ctr"/>
-            <a:r>
-              <a:rPr lang="en-US" dirty="0" err="1" smtClean="0"/>
-              <a:t>Git</a:t>
-            </a:r>
-            <a:endParaRPr lang="en-US" dirty="0"/>
-          </a:p>
-        </p:txBody>
-      </p:sp>
-      <p:sp>
-        <p:nvSpPr>
-          <p:cNvPr id="3" name="Content Placeholder 2"/>
-          <p:cNvSpPr>
-            <a:spLocks noGrp="1"/>
-          </p:cNvSpPr>
+      <p:pic>
+        <p:nvPicPr>
+          <p:cNvPr id="4" name="Content Placeholder 3"/>
+          <p:cNvPicPr>
+            <a:picLocks noGrp="1" noChangeAspect="1"/>
+          </p:cNvPicPr>
           <p:nvPr>
             <p:ph idx="1"/>
           </p:nvPr>
-        </p:nvSpPr>
-        <p:spPr/>
-        <p:txBody>
-          <a:bodyPr>
-            <a:normAutofit/>
+        </p:nvPicPr>
+        <p:blipFill>
+          <a:blip r:embed="rId2">
+            <a:extLst>
+              <a:ext uri="{28A0092B-C50C-407E-A947-70E740481C1C}">
+                <a14:useLocalDpi xmlns:a14="http://schemas.microsoft.com/office/drawing/2010/main" val="0"/>
+              </a:ext>
+            </a:extLst>
+          </a:blip>
+          <a:stretch>
+            <a:fillRect/>
+          </a:stretch>
+        </p:blipFill>
+        <p:spPr>
+          <a:xfrm>
+            <a:off x="3704883" y="105182"/>
+            <a:ext cx="6358600" cy="6571663"/>
+          </a:xfrm>
+        </p:spPr>
+      </p:pic>
+      <p:sp>
+        <p:nvSpPr>
+          <p:cNvPr id="3" name="TextBox 2"/>
+          <p:cNvSpPr txBox="1"/>
+          <p:nvPr/>
+        </p:nvSpPr>
+        <p:spPr>
+          <a:xfrm>
+            <a:off x="1505384" y="2422358"/>
+            <a:ext cx="827471" cy="1446550"/>
+          </a:xfrm>
+          <a:prstGeom prst="rect">
+            <a:avLst/>
+          </a:prstGeom>
+          <a:noFill/>
+        </p:spPr>
+        <p:txBody>
+          <a:bodyPr wrap="none" rtlCol="0">
+            <a:spAutoFit/>
           </a:bodyPr>
           <a:lstStyle/>
           <a:p>
             <a:r>
-              <a:rPr lang="en-US" sz="3600" dirty="0" smtClean="0"/>
-              <a:t>Distributed Version Control System.</a:t>
-            </a:r>
-          </a:p>
-          <a:p>
-            <a:r>
-              <a:rPr lang="en-US" sz="3600" dirty="0" smtClean="0"/>
-              <a:t>Each clone gets the entire project history.</a:t>
-            </a:r>
-          </a:p>
-          <a:p>
-            <a:r>
-              <a:rPr lang="en-US" sz="3600" dirty="0" smtClean="0"/>
-              <a:t>Code exists, in full, everywhere.</a:t>
-            </a:r>
-          </a:p>
-          <a:p>
-            <a:r>
-              <a:rPr lang="en-US" sz="3600" dirty="0" smtClean="0"/>
-              <a:t>Allows easy collaboration via GitHub.</a:t>
-            </a:r>
-          </a:p>
-          <a:p>
-            <a:endParaRPr lang="en-US" sz="3600" dirty="0"/>
+              <a:rPr lang="en-US" sz="8800" dirty="0" smtClean="0"/>
+              <a:t>:)</a:t>
+            </a:r>
+            <a:endParaRPr lang="en-US" sz="8800" dirty="0"/>
           </a:p>
         </p:txBody>
       </p:sp>
     </p:spTree>
     <p:extLst>
       <p:ext uri="{BB962C8B-B14F-4D97-AF65-F5344CB8AC3E}">
-        <p14:creationId xmlns:p14="http://schemas.microsoft.com/office/powerpoint/2010/main" val="2311746495"/>
+        <p14:creationId xmlns:p14="http://schemas.microsoft.com/office/powerpoint/2010/main" val="1151761814"/>
       </p:ext>
     </p:extLst>
   </p:cSld>
@@ -3486,6 +3466,105 @@
           <a:p>
             <a:pPr algn="ctr"/>
             <a:r>
+              <a:rPr lang="en-US" dirty="0" err="1" smtClean="0"/>
+              <a:t>Git</a:t>
+            </a:r>
+            <a:endParaRPr lang="en-US" dirty="0"/>
+          </a:p>
+        </p:txBody>
+      </p:sp>
+      <p:sp>
+        <p:nvSpPr>
+          <p:cNvPr id="3" name="Content Placeholder 2"/>
+          <p:cNvSpPr>
+            <a:spLocks noGrp="1"/>
+          </p:cNvSpPr>
+          <p:nvPr>
+            <p:ph idx="1"/>
+          </p:nvPr>
+        </p:nvSpPr>
+        <p:spPr/>
+        <p:txBody>
+          <a:bodyPr>
+            <a:normAutofit/>
+          </a:bodyPr>
+          <a:lstStyle/>
+          <a:p>
+            <a:r>
+              <a:rPr lang="en-US" sz="3600" dirty="0" smtClean="0"/>
+              <a:t>Distributed Version Control System.</a:t>
+            </a:r>
+          </a:p>
+          <a:p>
+            <a:r>
+              <a:rPr lang="en-US" sz="3600" dirty="0" smtClean="0"/>
+              <a:t>Each clone gets the entire project history.</a:t>
+            </a:r>
+          </a:p>
+          <a:p>
+            <a:r>
+              <a:rPr lang="en-US" sz="3600" dirty="0" smtClean="0"/>
+              <a:t>Code exists, in full, everywhere.</a:t>
+            </a:r>
+          </a:p>
+          <a:p>
+            <a:r>
+              <a:rPr lang="en-US" sz="3600" dirty="0" smtClean="0"/>
+              <a:t>Allows easy collaboration via GitHub.</a:t>
+            </a:r>
+          </a:p>
+          <a:p>
+            <a:endParaRPr lang="en-US" sz="3600" dirty="0"/>
+          </a:p>
+        </p:txBody>
+      </p:sp>
+    </p:spTree>
+    <p:extLst>
+      <p:ext uri="{BB962C8B-B14F-4D97-AF65-F5344CB8AC3E}">
+        <p14:creationId xmlns:p14="http://schemas.microsoft.com/office/powerpoint/2010/main" val="2311746495"/>
+      </p:ext>
+    </p:extLst>
+  </p:cSld>
+  <p:clrMapOvr>
+    <a:masterClrMapping/>
+  </p:clrMapOvr>
+</p:sld>
+</file>
+
+<file path=ppt/slides/slide15.xml><?xml version="1.0" encoding="utf-8"?>
+<p:sld xmlns:a="http://schemas.openxmlformats.org/drawingml/2006/main" xmlns:r="http://schemas.openxmlformats.org/officeDocument/2006/relationships" xmlns:p="http://schemas.openxmlformats.org/presentationml/2006/main">
+  <p:cSld>
+    <p:spTree>
+      <p:nvGrpSpPr>
+        <p:cNvPr id="1" name=""/>
+        <p:cNvGrpSpPr/>
+        <p:nvPr/>
+      </p:nvGrpSpPr>
+      <p:grpSpPr>
+        <a:xfrm>
+          <a:off x="0" y="0"/>
+          <a:ext cx="0" cy="0"/>
+          <a:chOff x="0" y="0"/>
+          <a:chExt cx="0" cy="0"/>
+        </a:xfrm>
+      </p:grpSpPr>
+      <p:sp>
+        <p:nvSpPr>
+          <p:cNvPr id="2" name="Title 1"/>
+          <p:cNvSpPr>
+            <a:spLocks noGrp="1"/>
+          </p:cNvSpPr>
+          <p:nvPr>
+            <p:ph type="title"/>
+          </p:nvPr>
+        </p:nvSpPr>
+        <p:spPr/>
+        <p:txBody>
+          <a:bodyPr/>
+          <a:lstStyle/>
+          <a:p>
+            <a:pPr algn="ctr"/>
+            <a:r>
               <a:rPr lang="en-US" dirty="0" smtClean="0"/>
               <a:t>Workflow with Commands</a:t>
             </a:r>
@@ -3623,7 +3702,7 @@
 </p:sld>
 </file>
 
-<file path=ppt/slides/slide15.xml><?xml version="1.0" encoding="utf-8"?>
+<file path=ppt/slides/slide16.xml><?xml version="1.0" encoding="utf-8"?>
 <p:sld xmlns:a="http://schemas.openxmlformats.org/drawingml/2006/main" xmlns:r="http://schemas.openxmlformats.org/officeDocument/2006/relationships" xmlns:p="http://schemas.openxmlformats.org/presentationml/2006/main">
   <p:cSld>
     <p:spTree>
@@ -4044,7 +4123,7 @@
 </p:sld>
 </file>
 
-<file path=ppt/slides/slide16.xml><?xml version="1.0" encoding="utf-8"?>
+<file path=ppt/slides/slide17.xml><?xml version="1.0" encoding="utf-8"?>
 <p:sld xmlns:a="http://schemas.openxmlformats.org/drawingml/2006/main" xmlns:r="http://schemas.openxmlformats.org/officeDocument/2006/relationships" xmlns:p="http://schemas.openxmlformats.org/presentationml/2006/main">
   <p:cSld>
     <p:spTree>
@@ -4152,7 +4231,7 @@
 </p:sld>
 </file>
 
-<file path=ppt/slides/slide17.xml><?xml version="1.0" encoding="utf-8"?>
+<file path=ppt/slides/slide18.xml><?xml version="1.0" encoding="utf-8"?>
 <p:sld xmlns:a="http://schemas.openxmlformats.org/drawingml/2006/main" xmlns:r="http://schemas.openxmlformats.org/officeDocument/2006/relationships" xmlns:p="http://schemas.openxmlformats.org/presentationml/2006/main">
   <p:cSld>
     <p:spTree>
@@ -4264,7 +4343,7 @@
 </p:sld>
 </file>
 
-<file path=ppt/slides/slide18.xml><?xml version="1.0" encoding="utf-8"?>
+<file path=ppt/slides/slide19.xml><?xml version="1.0" encoding="utf-8"?>
 <p:sld xmlns:a="http://schemas.openxmlformats.org/drawingml/2006/main" xmlns:r="http://schemas.openxmlformats.org/officeDocument/2006/relationships" xmlns:p="http://schemas.openxmlformats.org/presentationml/2006/main">
   <p:cSld>
     <p:spTree>
@@ -5850,109 +5929,15 @@
       </p:grpSpPr>
       <p:sp>
         <p:nvSpPr>
-          <p:cNvPr id="5" name="Rectangle 4"/>
-          <p:cNvSpPr/>
+          <p:cNvPr id="6" name="Title 1"/>
+          <p:cNvSpPr txBox="1">
+            <a:spLocks/>
+          </p:cNvSpPr>
           <p:nvPr/>
         </p:nvSpPr>
         <p:spPr>
           <a:xfrm>
-            <a:off x="777210" y="1636296"/>
-            <a:ext cx="10564559" cy="4524315"/>
-          </a:xfrm>
-          <a:prstGeom prst="rect">
-            <a:avLst/>
-          </a:prstGeom>
-        </p:spPr>
-        <p:style>
-          <a:lnRef idx="1">
-            <a:schemeClr val="accent6"/>
-          </a:lnRef>
-          <a:fillRef idx="2">
-            <a:schemeClr val="accent6"/>
-          </a:fillRef>
-          <a:effectRef idx="1">
-            <a:schemeClr val="accent6"/>
-          </a:effectRef>
-          <a:fontRef idx="minor">
-            <a:schemeClr val="dk1"/>
-          </a:fontRef>
-        </p:style>
-        <p:txBody>
-          <a:bodyPr wrap="none">
-            <a:spAutoFit/>
-          </a:bodyPr>
-          <a:lstStyle/>
-          <a:p>
-            <a:r>
-              <a:rPr lang="en-US" sz="3200" dirty="0" smtClean="0"/>
-              <a:t>Learn Code the Hard way</a:t>
-            </a:r>
-            <a:endParaRPr lang="en-US" sz="3200" dirty="0" smtClean="0">
-              <a:hlinkClick r:id="rId2"/>
-            </a:endParaRPr>
-          </a:p>
-          <a:p>
-            <a:r>
-              <a:rPr lang="en-US" sz="3200" dirty="0" smtClean="0">
-                <a:hlinkClick r:id="rId2"/>
-              </a:rPr>
-              <a:t>http://cli.learncodethehardway.org/</a:t>
-            </a:r>
-            <a:endParaRPr lang="en-US" sz="3200" dirty="0" smtClean="0"/>
-          </a:p>
-          <a:p>
-            <a:endParaRPr lang="en-US" sz="3200" dirty="0" smtClean="0"/>
-          </a:p>
-          <a:p>
-            <a:r>
-              <a:rPr lang="en-US" sz="3200" dirty="0" err="1" smtClean="0"/>
-              <a:t>Codecademy</a:t>
-            </a:r>
-            <a:endParaRPr lang="en-US" sz="3200" dirty="0"/>
-          </a:p>
-          <a:p>
-            <a:r>
-              <a:rPr lang="en-US" sz="3200" dirty="0" smtClean="0">
-                <a:hlinkClick r:id="rId3"/>
-              </a:rPr>
-              <a:t>https://www.codecademy.com/learn/learn-the-command-line</a:t>
-            </a:r>
-            <a:endParaRPr lang="en-US" sz="3200" dirty="0" smtClean="0"/>
-          </a:p>
-          <a:p>
-            <a:endParaRPr lang="en-US" sz="3200" dirty="0"/>
-          </a:p>
-          <a:p>
-            <a:r>
-              <a:rPr lang="en-US" sz="3200" dirty="0" smtClean="0"/>
-              <a:t>CLI Quiz</a:t>
-            </a:r>
-          </a:p>
-          <a:p>
-            <a:r>
-              <a:rPr lang="en-US" sz="3200" dirty="0" smtClean="0">
-                <a:hlinkClick r:id="rId4"/>
-              </a:rPr>
-              <a:t>https://github.com/bmw9t/command_line_quiz/</a:t>
-            </a:r>
-            <a:endParaRPr lang="en-US" sz="3200" dirty="0" smtClean="0"/>
-          </a:p>
-          <a:p>
-            <a:endParaRPr lang="en-US" sz="3200" dirty="0" smtClean="0"/>
-          </a:p>
-        </p:txBody>
-      </p:sp>
-      <p:sp>
-        <p:nvSpPr>
-          <p:cNvPr id="7" name="Title 1"/>
-          <p:cNvSpPr txBox="1">
-            <a:spLocks/>
-          </p:cNvSpPr>
-          <p:nvPr/>
-        </p:nvSpPr>
-        <p:spPr>
-          <a:xfrm>
-            <a:off x="2197769" y="-385595"/>
+            <a:off x="3176337" y="-481847"/>
             <a:ext cx="9144000" cy="2387600"/>
           </a:xfrm>
           <a:prstGeom prst="rect">
@@ -5985,16 +5970,46 @@
           <a:p>
             <a:r>
               <a:rPr lang="en-US" dirty="0" smtClean="0"/>
-              <a:t>Getting Help for the NEXT LEVEL</a:t>
+              <a:t>With great power….</a:t>
             </a:r>
             <a:endParaRPr lang="en-US" dirty="0"/>
           </a:p>
         </p:txBody>
       </p:sp>
+      <p:pic>
+        <p:nvPicPr>
+          <p:cNvPr id="3" name="Picture 2"/>
+          <p:cNvPicPr>
+            <a:picLocks noChangeAspect="1"/>
+          </p:cNvPicPr>
+          <p:nvPr/>
+        </p:nvPicPr>
+        <p:blipFill>
+          <a:blip r:embed="rId2">
+            <a:extLst>
+              <a:ext uri="{28A0092B-C50C-407E-A947-70E740481C1C}">
+                <a14:useLocalDpi xmlns:a14="http://schemas.microsoft.com/office/drawing/2010/main" val="0"/>
+              </a:ext>
+            </a:extLst>
+          </a:blip>
+          <a:stretch>
+            <a:fillRect/>
+          </a:stretch>
+        </p:blipFill>
+        <p:spPr>
+          <a:xfrm>
+            <a:off x="1138988" y="1299411"/>
+            <a:ext cx="9596437" cy="4952999"/>
+          </a:xfrm>
+          <a:prstGeom prst="rect">
+            <a:avLst/>
+          </a:prstGeom>
+        </p:spPr>
+      </p:pic>
     </p:spTree>
     <p:extLst>
       <p:ext uri="{BB962C8B-B14F-4D97-AF65-F5344CB8AC3E}">
-        <p14:creationId xmlns:p14="http://schemas.microsoft.com/office/powerpoint/2010/main" val="923527942"/>
+        <p14:creationId xmlns:p14="http://schemas.microsoft.com/office/powerpoint/2010/main" val="1779352926"/>
       </p:ext>
     </p:extLst>
   </p:cSld>
@@ -6023,52 +6038,143 @@
       </p:grpSpPr>
       <p:sp>
         <p:nvSpPr>
-          <p:cNvPr id="2" name="Title 1"/>
-          <p:cNvSpPr>
-            <a:spLocks noGrp="1"/>
-          </p:cNvSpPr>
-          <p:nvPr>
-            <p:ph type="ctrTitle"/>
-          </p:nvPr>
-        </p:nvSpPr>
-        <p:spPr/>
-        <p:txBody>
-          <a:bodyPr/>
-          <a:lstStyle/>
+          <p:cNvPr id="5" name="Rectangle 4"/>
+          <p:cNvSpPr/>
+          <p:nvPr/>
+        </p:nvSpPr>
+        <p:spPr>
+          <a:xfrm>
+            <a:off x="777210" y="1636296"/>
+            <a:ext cx="10564559" cy="4524315"/>
+          </a:xfrm>
+          <a:prstGeom prst="rect">
+            <a:avLst/>
+          </a:prstGeom>
+        </p:spPr>
+        <p:style>
+          <a:lnRef idx="1">
+            <a:schemeClr val="accent6"/>
+          </a:lnRef>
+          <a:fillRef idx="2">
+            <a:schemeClr val="accent6"/>
+          </a:fillRef>
+          <a:effectRef idx="1">
+            <a:schemeClr val="accent6"/>
+          </a:effectRef>
+          <a:fontRef idx="minor">
+            <a:schemeClr val="dk1"/>
+          </a:fontRef>
+        </p:style>
+        <p:txBody>
+          <a:bodyPr wrap="none">
+            <a:spAutoFit/>
+          </a:bodyPr>
+          <a:lstStyle/>
+          <a:p>
+            <a:r>
+              <a:rPr lang="en-US" sz="3200" dirty="0" smtClean="0"/>
+              <a:t>Learn Code the Hard way</a:t>
+            </a:r>
+            <a:endParaRPr lang="en-US" sz="3200" dirty="0" smtClean="0">
+              <a:hlinkClick r:id="rId2"/>
+            </a:endParaRPr>
+          </a:p>
+          <a:p>
+            <a:r>
+              <a:rPr lang="en-US" sz="3200" dirty="0" smtClean="0">
+                <a:hlinkClick r:id="rId2"/>
+              </a:rPr>
+              <a:t>http://cli.learncodethehardway.org/</a:t>
+            </a:r>
+            <a:endParaRPr lang="en-US" sz="3200" dirty="0" smtClean="0"/>
+          </a:p>
+          <a:p>
+            <a:endParaRPr lang="en-US" sz="3200" dirty="0" smtClean="0"/>
+          </a:p>
+          <a:p>
+            <a:r>
+              <a:rPr lang="en-US" sz="3200" dirty="0" err="1" smtClean="0"/>
+              <a:t>Codecademy</a:t>
+            </a:r>
+            <a:endParaRPr lang="en-US" sz="3200" dirty="0"/>
+          </a:p>
+          <a:p>
+            <a:r>
+              <a:rPr lang="en-US" sz="3200" dirty="0" smtClean="0">
+                <a:hlinkClick r:id="rId3"/>
+              </a:rPr>
+              <a:t>https://www.codecademy.com/learn/learn-the-command-line</a:t>
+            </a:r>
+            <a:endParaRPr lang="en-US" sz="3200" dirty="0" smtClean="0"/>
+          </a:p>
+          <a:p>
+            <a:endParaRPr lang="en-US" sz="3200" dirty="0"/>
+          </a:p>
+          <a:p>
+            <a:r>
+              <a:rPr lang="en-US" sz="3200" dirty="0" smtClean="0"/>
+              <a:t>CLI Quiz</a:t>
+            </a:r>
+          </a:p>
+          <a:p>
+            <a:r>
+              <a:rPr lang="en-US" sz="3200" dirty="0" smtClean="0">
+                <a:hlinkClick r:id="rId4"/>
+              </a:rPr>
+              <a:t>https://github.com/bmw9t/command_line_quiz/</a:t>
+            </a:r>
+            <a:endParaRPr lang="en-US" sz="3200" dirty="0" smtClean="0"/>
+          </a:p>
+          <a:p>
+            <a:endParaRPr lang="en-US" sz="3200" dirty="0" smtClean="0"/>
+          </a:p>
+        </p:txBody>
+      </p:sp>
+      <p:sp>
+        <p:nvSpPr>
+          <p:cNvPr id="7" name="Title 1"/>
+          <p:cNvSpPr txBox="1">
+            <a:spLocks/>
+          </p:cNvSpPr>
+          <p:nvPr/>
+        </p:nvSpPr>
+        <p:spPr>
+          <a:xfrm>
+            <a:off x="2197769" y="-385595"/>
+            <a:ext cx="9144000" cy="2387600"/>
+          </a:xfrm>
+          <a:prstGeom prst="rect">
+            <a:avLst/>
+          </a:prstGeom>
+        </p:spPr>
+        <p:txBody>
+          <a:bodyPr vert="horz" lIns="91440" tIns="45720" rIns="91440" bIns="45720" rtlCol="0" anchor="ctr">
+            <a:normAutofit/>
+          </a:bodyPr>
+          <a:lstStyle>
+            <a:lvl1pPr algn="l" defTabSz="914400" rtl="0" eaLnBrk="1" latinLnBrk="0" hangingPunct="1">
+              <a:lnSpc>
+                <a:spcPct val="90000"/>
+              </a:lnSpc>
+              <a:spcBef>
+                <a:spcPct val="0"/>
+              </a:spcBef>
+              <a:buNone/>
+              <a:defRPr sz="4400" kern="1200">
+                <a:solidFill>
+                  <a:schemeClr val="tx1"/>
+                </a:solidFill>
+                <a:latin typeface="+mj-lt"/>
+                <a:ea typeface="+mj-ea"/>
+                <a:cs typeface="+mj-cs"/>
+              </a:defRPr>
+            </a:lvl1pPr>
+          </a:lstStyle>
           <a:p>
             <a:r>
               <a:rPr lang="en-US" dirty="0" smtClean="0"/>
-              <a:t>Introduction to </a:t>
-            </a:r>
-            <a:r>
-              <a:rPr lang="en-US" dirty="0" err="1" smtClean="0"/>
-              <a:t>Git</a:t>
-            </a:r>
-            <a:endParaRPr lang="en-US" dirty="0"/>
-          </a:p>
-        </p:txBody>
-      </p:sp>
-      <p:sp>
-        <p:nvSpPr>
-          <p:cNvPr id="3" name="Subtitle 2"/>
-          <p:cNvSpPr>
-            <a:spLocks noGrp="1"/>
-          </p:cNvSpPr>
-          <p:nvPr>
-            <p:ph type="subTitle" idx="1"/>
-          </p:nvPr>
-        </p:nvSpPr>
-        <p:spPr/>
-        <p:txBody>
-          <a:bodyPr/>
-          <a:lstStyle/>
-          <a:p>
-            <a:r>
-              <a:rPr lang="en-US" dirty="0" smtClean="0"/>
-              <a:t>HILT 2018</a:t>
-            </a:r>
-          </a:p>
-          <a:p>
+              <a:t>Getting Help for the NEXT LEVEL</a:t>
+            </a:r>
             <a:endParaRPr lang="en-US" dirty="0"/>
           </a:p>
         </p:txBody>
@@ -6076,7 +6182,7 @@
     </p:spTree>
     <p:extLst>
       <p:ext uri="{BB962C8B-B14F-4D97-AF65-F5344CB8AC3E}">
-        <p14:creationId xmlns:p14="http://schemas.microsoft.com/office/powerpoint/2010/main" val="4066827190"/>
+        <p14:creationId xmlns:p14="http://schemas.microsoft.com/office/powerpoint/2010/main" val="923527942"/>
       </p:ext>
     </p:extLst>
   </p:cSld>

</xml_diff>

<commit_message>
added kermit meme to git slides
</commit_message>
<xml_diff>
--- a/2018/misc/CLI Git.pptx
+++ b/2018/misc/CLI Git.pptx
@@ -21,9 +21,10 @@
     <p:sldId id="272" r:id="rId15"/>
     <p:sldId id="275" r:id="rId16"/>
     <p:sldId id="277" r:id="rId17"/>
-    <p:sldId id="278" r:id="rId18"/>
-    <p:sldId id="279" r:id="rId19"/>
-    <p:sldId id="281" r:id="rId20"/>
+    <p:sldId id="283" r:id="rId18"/>
+    <p:sldId id="278" r:id="rId19"/>
+    <p:sldId id="279" r:id="rId20"/>
+    <p:sldId id="281" r:id="rId21"/>
   </p:sldIdLst>
   <p:sldSz cx="12192000" cy="6858000"/>
   <p:notesSz cx="6858000" cy="9144000"/>
@@ -4142,6 +4143,65 @@
       </p:grpSpPr>
       <p:pic>
         <p:nvPicPr>
+          <p:cNvPr id="4" name="Content Placeholder 3"/>
+          <p:cNvPicPr>
+            <a:picLocks noGrp="1" noChangeAspect="1"/>
+          </p:cNvPicPr>
+          <p:nvPr>
+            <p:ph idx="1"/>
+          </p:nvPr>
+        </p:nvPicPr>
+        <p:blipFill>
+          <a:blip r:embed="rId2">
+            <a:extLst>
+              <a:ext uri="{28A0092B-C50C-407E-A947-70E740481C1C}">
+                <a14:useLocalDpi xmlns:a14="http://schemas.microsoft.com/office/drawing/2010/main" val="0"/>
+              </a:ext>
+            </a:extLst>
+          </a:blip>
+          <a:stretch>
+            <a:fillRect/>
+          </a:stretch>
+        </p:blipFill>
+        <p:spPr>
+          <a:xfrm>
+            <a:off x="833097" y="1155032"/>
+            <a:ext cx="10569832" cy="4907422"/>
+          </a:xfrm>
+        </p:spPr>
+      </p:pic>
+    </p:spTree>
+    <p:extLst>
+      <p:ext uri="{BB962C8B-B14F-4D97-AF65-F5344CB8AC3E}">
+        <p14:creationId xmlns:p14="http://schemas.microsoft.com/office/powerpoint/2010/main" val="3771610016"/>
+      </p:ext>
+    </p:extLst>
+  </p:cSld>
+  <p:clrMapOvr>
+    <a:masterClrMapping/>
+  </p:clrMapOvr>
+</p:sld>
+</file>
+
+<file path=ppt/slides/slide18.xml><?xml version="1.0" encoding="utf-8"?>
+<p:sld xmlns:a="http://schemas.openxmlformats.org/drawingml/2006/main" xmlns:r="http://schemas.openxmlformats.org/officeDocument/2006/relationships" xmlns:p="http://schemas.openxmlformats.org/presentationml/2006/main">
+  <p:cSld>
+    <p:spTree>
+      <p:nvGrpSpPr>
+        <p:cNvPr id="1" name=""/>
+        <p:cNvGrpSpPr/>
+        <p:nvPr/>
+      </p:nvGrpSpPr>
+      <p:grpSpPr>
+        <a:xfrm>
+          <a:off x="0" y="0"/>
+          <a:ext cx="0" cy="0"/>
+          <a:chOff x="0" y="0"/>
+          <a:chExt cx="0" cy="0"/>
+        </a:xfrm>
+      </p:grpSpPr>
+      <p:pic>
+        <p:nvPicPr>
           <p:cNvPr id="4" name="Picture 3"/>
           <p:cNvPicPr>
             <a:picLocks noChangeAspect="1"/>
@@ -4231,7 +4291,7 @@
 </p:sld>
 </file>
 
-<file path=ppt/slides/slide18.xml><?xml version="1.0" encoding="utf-8"?>
+<file path=ppt/slides/slide19.xml><?xml version="1.0" encoding="utf-8"?>
 <p:sld xmlns:a="http://schemas.openxmlformats.org/drawingml/2006/main" xmlns:r="http://schemas.openxmlformats.org/officeDocument/2006/relationships" xmlns:p="http://schemas.openxmlformats.org/presentationml/2006/main">
   <p:cSld>
     <p:spTree>
@@ -4334,246 +4394,6 @@
     <p:extLst>
       <p:ext uri="{BB962C8B-B14F-4D97-AF65-F5344CB8AC3E}">
         <p14:creationId xmlns:p14="http://schemas.microsoft.com/office/powerpoint/2010/main" val="2203433950"/>
-      </p:ext>
-    </p:extLst>
-  </p:cSld>
-  <p:clrMapOvr>
-    <a:masterClrMapping/>
-  </p:clrMapOvr>
-</p:sld>
-</file>
-
-<file path=ppt/slides/slide19.xml><?xml version="1.0" encoding="utf-8"?>
-<p:sld xmlns:a="http://schemas.openxmlformats.org/drawingml/2006/main" xmlns:r="http://schemas.openxmlformats.org/officeDocument/2006/relationships" xmlns:p="http://schemas.openxmlformats.org/presentationml/2006/main">
-  <p:cSld>
-    <p:spTree>
-      <p:nvGrpSpPr>
-        <p:cNvPr id="1" name=""/>
-        <p:cNvGrpSpPr/>
-        <p:nvPr/>
-      </p:nvGrpSpPr>
-      <p:grpSpPr>
-        <a:xfrm>
-          <a:off x="0" y="0"/>
-          <a:ext cx="0" cy="0"/>
-          <a:chOff x="0" y="0"/>
-          <a:chExt cx="0" cy="0"/>
-        </a:xfrm>
-      </p:grpSpPr>
-      <p:sp>
-        <p:nvSpPr>
-          <p:cNvPr id="5" name="Rectangle 4"/>
-          <p:cNvSpPr/>
-          <p:nvPr/>
-        </p:nvSpPr>
-        <p:spPr>
-          <a:xfrm>
-            <a:off x="777210" y="1267328"/>
-            <a:ext cx="10564559" cy="5262979"/>
-          </a:xfrm>
-          <a:prstGeom prst="rect">
-            <a:avLst/>
-          </a:prstGeom>
-        </p:spPr>
-        <p:style>
-          <a:lnRef idx="1">
-            <a:schemeClr val="accent6"/>
-          </a:lnRef>
-          <a:fillRef idx="2">
-            <a:schemeClr val="accent6"/>
-          </a:fillRef>
-          <a:effectRef idx="1">
-            <a:schemeClr val="accent6"/>
-          </a:effectRef>
-          <a:fontRef idx="minor">
-            <a:schemeClr val="dk1"/>
-          </a:fontRef>
-        </p:style>
-        <p:txBody>
-          <a:bodyPr wrap="square">
-            <a:spAutoFit/>
-          </a:bodyPr>
-          <a:lstStyle/>
-          <a:p>
-            <a:r>
-              <a:rPr lang="en-US" sz="2800" dirty="0" err="1" smtClean="0"/>
-              <a:t>Git</a:t>
-            </a:r>
-            <a:r>
-              <a:rPr lang="en-US" sz="2800" dirty="0" smtClean="0"/>
-              <a:t> tutorials and documentation</a:t>
-            </a:r>
-          </a:p>
-          <a:p>
-            <a:r>
-              <a:rPr lang="en-US" sz="2800" dirty="0">
-                <a:hlinkClick r:id="rId2"/>
-              </a:rPr>
-              <a:t>https://www.atlassian.com/git/tutorials</a:t>
-            </a:r>
-            <a:r>
-              <a:rPr lang="en-US" sz="2800" dirty="0" smtClean="0">
-                <a:hlinkClick r:id="rId2"/>
-              </a:rPr>
-              <a:t>/</a:t>
-            </a:r>
-            <a:endParaRPr lang="en-US" sz="2800" dirty="0" smtClean="0"/>
-          </a:p>
-          <a:p>
-            <a:r>
-              <a:rPr lang="en-US" sz="2800" dirty="0">
-                <a:hlinkClick r:id="rId3"/>
-              </a:rPr>
-              <a:t>https://</a:t>
-            </a:r>
-            <a:r>
-              <a:rPr lang="en-US" sz="2800" dirty="0" smtClean="0">
-                <a:hlinkClick r:id="rId3"/>
-              </a:rPr>
-              <a:t>www.codecademy.com/learn/learn-git</a:t>
-            </a:r>
-            <a:endParaRPr lang="en-US" sz="2800" dirty="0" smtClean="0"/>
-          </a:p>
-          <a:p>
-            <a:r>
-              <a:rPr lang="en-US" sz="2800" dirty="0" smtClean="0">
-                <a:hlinkClick r:id="rId4"/>
-              </a:rPr>
-              <a:t>https://git-scm.com/doc</a:t>
-            </a:r>
-            <a:endParaRPr lang="en-US" sz="2800" dirty="0" smtClean="0"/>
-          </a:p>
-          <a:p>
-            <a:endParaRPr lang="en-US" sz="2800" dirty="0" smtClean="0"/>
-          </a:p>
-          <a:p>
-            <a:r>
-              <a:rPr lang="en-US" sz="2800" dirty="0" err="1" smtClean="0"/>
-              <a:t>Git</a:t>
-            </a:r>
-            <a:r>
-              <a:rPr lang="en-US" sz="2800" dirty="0" smtClean="0"/>
-              <a:t> for ages 4 and up</a:t>
-            </a:r>
-          </a:p>
-          <a:p>
-            <a:r>
-              <a:rPr lang="en-US" sz="2800" dirty="0" smtClean="0">
-                <a:hlinkClick r:id="rId5"/>
-              </a:rPr>
-              <a:t>https://youtu.be/1ffBJ4sVUb4</a:t>
-            </a:r>
-            <a:endParaRPr lang="en-US" sz="2800" dirty="0" smtClean="0"/>
-          </a:p>
-          <a:p>
-            <a:endParaRPr lang="en-US" sz="2800" dirty="0" smtClean="0"/>
-          </a:p>
-          <a:p>
-            <a:r>
-              <a:rPr lang="en-US" sz="2800" dirty="0" smtClean="0"/>
-              <a:t>GitHub</a:t>
-            </a:r>
-          </a:p>
-          <a:p>
-            <a:r>
-              <a:rPr lang="en-US" sz="2800" dirty="0">
-                <a:hlinkClick r:id="rId6"/>
-              </a:rPr>
-              <a:t>https://github.com</a:t>
-            </a:r>
-            <a:r>
-              <a:rPr lang="en-US" sz="2800" dirty="0" smtClean="0">
-                <a:hlinkClick r:id="rId6"/>
-              </a:rPr>
-              <a:t>/</a:t>
-            </a:r>
-            <a:endParaRPr lang="en-US" sz="2800" dirty="0" smtClean="0"/>
-          </a:p>
-          <a:p>
-            <a:r>
-              <a:rPr lang="en-US" sz="2800" dirty="0">
-                <a:hlinkClick r:id="rId7"/>
-              </a:rPr>
-              <a:t>http://rogerdudler.github.io/git-guide</a:t>
-            </a:r>
-            <a:r>
-              <a:rPr lang="en-US" sz="2800" dirty="0" smtClean="0">
-                <a:hlinkClick r:id="rId7"/>
-              </a:rPr>
-              <a:t>/</a:t>
-            </a:r>
-            <a:endParaRPr lang="en-US" sz="2800" dirty="0" smtClean="0"/>
-          </a:p>
-          <a:p>
-            <a:r>
-              <a:rPr lang="en-US" sz="2800" dirty="0">
-                <a:hlinkClick r:id="rId8"/>
-              </a:rPr>
-              <a:t>https://guides.github.com</a:t>
-            </a:r>
-            <a:r>
-              <a:rPr lang="en-US" sz="2800" dirty="0" smtClean="0">
-                <a:hlinkClick r:id="rId8"/>
-              </a:rPr>
-              <a:t>/</a:t>
-            </a:r>
-            <a:endParaRPr lang="en-US" sz="2800" dirty="0" smtClean="0"/>
-          </a:p>
-        </p:txBody>
-      </p:sp>
-      <p:sp>
-        <p:nvSpPr>
-          <p:cNvPr id="7" name="Title 1"/>
-          <p:cNvSpPr txBox="1">
-            <a:spLocks/>
-          </p:cNvSpPr>
-          <p:nvPr/>
-        </p:nvSpPr>
-        <p:spPr>
-          <a:xfrm>
-            <a:off x="2197769" y="-385595"/>
-            <a:ext cx="9144000" cy="2387600"/>
-          </a:xfrm>
-          <a:prstGeom prst="rect">
-            <a:avLst/>
-          </a:prstGeom>
-        </p:spPr>
-        <p:txBody>
-          <a:bodyPr vert="horz" lIns="91440" tIns="45720" rIns="91440" bIns="45720" rtlCol="0" anchor="ctr">
-            <a:normAutofit/>
-          </a:bodyPr>
-          <a:lstStyle>
-            <a:lvl1pPr algn="l" defTabSz="914400" rtl="0" eaLnBrk="1" latinLnBrk="0" hangingPunct="1">
-              <a:lnSpc>
-                <a:spcPct val="90000"/>
-              </a:lnSpc>
-              <a:spcBef>
-                <a:spcPct val="0"/>
-              </a:spcBef>
-              <a:buNone/>
-              <a:defRPr sz="4400" kern="1200">
-                <a:solidFill>
-                  <a:schemeClr val="tx1"/>
-                </a:solidFill>
-                <a:latin typeface="+mj-lt"/>
-                <a:ea typeface="+mj-ea"/>
-                <a:cs typeface="+mj-cs"/>
-              </a:defRPr>
-            </a:lvl1pPr>
-          </a:lstStyle>
-          <a:p>
-            <a:r>
-              <a:rPr lang="en-US" dirty="0" smtClean="0"/>
-              <a:t>Getting Help for the NEXT LEVEL</a:t>
-            </a:r>
-            <a:endParaRPr lang="en-US" dirty="0"/>
-          </a:p>
-        </p:txBody>
-      </p:sp>
-    </p:spTree>
-    <p:extLst>
-      <p:ext uri="{BB962C8B-B14F-4D97-AF65-F5344CB8AC3E}">
-        <p14:creationId xmlns:p14="http://schemas.microsoft.com/office/powerpoint/2010/main" val="193045592"/>
       </p:ext>
     </p:extLst>
   </p:cSld>
@@ -4718,6 +4538,246 @@
     <p:extLst>
       <p:ext uri="{BB962C8B-B14F-4D97-AF65-F5344CB8AC3E}">
         <p14:creationId xmlns:p14="http://schemas.microsoft.com/office/powerpoint/2010/main" val="2625601115"/>
+      </p:ext>
+    </p:extLst>
+  </p:cSld>
+  <p:clrMapOvr>
+    <a:masterClrMapping/>
+  </p:clrMapOvr>
+</p:sld>
+</file>
+
+<file path=ppt/slides/slide20.xml><?xml version="1.0" encoding="utf-8"?>
+<p:sld xmlns:a="http://schemas.openxmlformats.org/drawingml/2006/main" xmlns:r="http://schemas.openxmlformats.org/officeDocument/2006/relationships" xmlns:p="http://schemas.openxmlformats.org/presentationml/2006/main">
+  <p:cSld>
+    <p:spTree>
+      <p:nvGrpSpPr>
+        <p:cNvPr id="1" name=""/>
+        <p:cNvGrpSpPr/>
+        <p:nvPr/>
+      </p:nvGrpSpPr>
+      <p:grpSpPr>
+        <a:xfrm>
+          <a:off x="0" y="0"/>
+          <a:ext cx="0" cy="0"/>
+          <a:chOff x="0" y="0"/>
+          <a:chExt cx="0" cy="0"/>
+        </a:xfrm>
+      </p:grpSpPr>
+      <p:sp>
+        <p:nvSpPr>
+          <p:cNvPr id="5" name="Rectangle 4"/>
+          <p:cNvSpPr/>
+          <p:nvPr/>
+        </p:nvSpPr>
+        <p:spPr>
+          <a:xfrm>
+            <a:off x="777210" y="1267328"/>
+            <a:ext cx="10564559" cy="5262979"/>
+          </a:xfrm>
+          <a:prstGeom prst="rect">
+            <a:avLst/>
+          </a:prstGeom>
+        </p:spPr>
+        <p:style>
+          <a:lnRef idx="1">
+            <a:schemeClr val="accent6"/>
+          </a:lnRef>
+          <a:fillRef idx="2">
+            <a:schemeClr val="accent6"/>
+          </a:fillRef>
+          <a:effectRef idx="1">
+            <a:schemeClr val="accent6"/>
+          </a:effectRef>
+          <a:fontRef idx="minor">
+            <a:schemeClr val="dk1"/>
+          </a:fontRef>
+        </p:style>
+        <p:txBody>
+          <a:bodyPr wrap="square">
+            <a:spAutoFit/>
+          </a:bodyPr>
+          <a:lstStyle/>
+          <a:p>
+            <a:r>
+              <a:rPr lang="en-US" sz="2800" dirty="0" err="1" smtClean="0"/>
+              <a:t>Git</a:t>
+            </a:r>
+            <a:r>
+              <a:rPr lang="en-US" sz="2800" dirty="0" smtClean="0"/>
+              <a:t> tutorials and documentation</a:t>
+            </a:r>
+          </a:p>
+          <a:p>
+            <a:r>
+              <a:rPr lang="en-US" sz="2800" dirty="0">
+                <a:hlinkClick r:id="rId2"/>
+              </a:rPr>
+              <a:t>https://www.atlassian.com/git/tutorials</a:t>
+            </a:r>
+            <a:r>
+              <a:rPr lang="en-US" sz="2800" dirty="0" smtClean="0">
+                <a:hlinkClick r:id="rId2"/>
+              </a:rPr>
+              <a:t>/</a:t>
+            </a:r>
+            <a:endParaRPr lang="en-US" sz="2800" dirty="0" smtClean="0"/>
+          </a:p>
+          <a:p>
+            <a:r>
+              <a:rPr lang="en-US" sz="2800" dirty="0">
+                <a:hlinkClick r:id="rId3"/>
+              </a:rPr>
+              <a:t>https://</a:t>
+            </a:r>
+            <a:r>
+              <a:rPr lang="en-US" sz="2800" dirty="0" smtClean="0">
+                <a:hlinkClick r:id="rId3"/>
+              </a:rPr>
+              <a:t>www.codecademy.com/learn/learn-git</a:t>
+            </a:r>
+            <a:endParaRPr lang="en-US" sz="2800" dirty="0" smtClean="0"/>
+          </a:p>
+          <a:p>
+            <a:r>
+              <a:rPr lang="en-US" sz="2800" dirty="0" smtClean="0">
+                <a:hlinkClick r:id="rId4"/>
+              </a:rPr>
+              <a:t>https://git-scm.com/doc</a:t>
+            </a:r>
+            <a:endParaRPr lang="en-US" sz="2800" dirty="0" smtClean="0"/>
+          </a:p>
+          <a:p>
+            <a:endParaRPr lang="en-US" sz="2800" dirty="0" smtClean="0"/>
+          </a:p>
+          <a:p>
+            <a:r>
+              <a:rPr lang="en-US" sz="2800" dirty="0" err="1" smtClean="0"/>
+              <a:t>Git</a:t>
+            </a:r>
+            <a:r>
+              <a:rPr lang="en-US" sz="2800" dirty="0" smtClean="0"/>
+              <a:t> for ages 4 and up</a:t>
+            </a:r>
+          </a:p>
+          <a:p>
+            <a:r>
+              <a:rPr lang="en-US" sz="2800" dirty="0" smtClean="0">
+                <a:hlinkClick r:id="rId5"/>
+              </a:rPr>
+              <a:t>https://youtu.be/1ffBJ4sVUb4</a:t>
+            </a:r>
+            <a:endParaRPr lang="en-US" sz="2800" dirty="0" smtClean="0"/>
+          </a:p>
+          <a:p>
+            <a:endParaRPr lang="en-US" sz="2800" dirty="0" smtClean="0"/>
+          </a:p>
+          <a:p>
+            <a:r>
+              <a:rPr lang="en-US" sz="2800" dirty="0" smtClean="0"/>
+              <a:t>GitHub</a:t>
+            </a:r>
+          </a:p>
+          <a:p>
+            <a:r>
+              <a:rPr lang="en-US" sz="2800" dirty="0">
+                <a:hlinkClick r:id="rId6"/>
+              </a:rPr>
+              <a:t>https://github.com</a:t>
+            </a:r>
+            <a:r>
+              <a:rPr lang="en-US" sz="2800" dirty="0" smtClean="0">
+                <a:hlinkClick r:id="rId6"/>
+              </a:rPr>
+              <a:t>/</a:t>
+            </a:r>
+            <a:endParaRPr lang="en-US" sz="2800" dirty="0" smtClean="0"/>
+          </a:p>
+          <a:p>
+            <a:r>
+              <a:rPr lang="en-US" sz="2800" dirty="0">
+                <a:hlinkClick r:id="rId7"/>
+              </a:rPr>
+              <a:t>http://rogerdudler.github.io/git-guide</a:t>
+            </a:r>
+            <a:r>
+              <a:rPr lang="en-US" sz="2800" dirty="0" smtClean="0">
+                <a:hlinkClick r:id="rId7"/>
+              </a:rPr>
+              <a:t>/</a:t>
+            </a:r>
+            <a:endParaRPr lang="en-US" sz="2800" dirty="0" smtClean="0"/>
+          </a:p>
+          <a:p>
+            <a:r>
+              <a:rPr lang="en-US" sz="2800" dirty="0">
+                <a:hlinkClick r:id="rId8"/>
+              </a:rPr>
+              <a:t>https://guides.github.com</a:t>
+            </a:r>
+            <a:r>
+              <a:rPr lang="en-US" sz="2800" dirty="0" smtClean="0">
+                <a:hlinkClick r:id="rId8"/>
+              </a:rPr>
+              <a:t>/</a:t>
+            </a:r>
+            <a:endParaRPr lang="en-US" sz="2800" dirty="0" smtClean="0"/>
+          </a:p>
+        </p:txBody>
+      </p:sp>
+      <p:sp>
+        <p:nvSpPr>
+          <p:cNvPr id="7" name="Title 1"/>
+          <p:cNvSpPr txBox="1">
+            <a:spLocks/>
+          </p:cNvSpPr>
+          <p:nvPr/>
+        </p:nvSpPr>
+        <p:spPr>
+          <a:xfrm>
+            <a:off x="2197769" y="-385595"/>
+            <a:ext cx="9144000" cy="2387600"/>
+          </a:xfrm>
+          <a:prstGeom prst="rect">
+            <a:avLst/>
+          </a:prstGeom>
+        </p:spPr>
+        <p:txBody>
+          <a:bodyPr vert="horz" lIns="91440" tIns="45720" rIns="91440" bIns="45720" rtlCol="0" anchor="ctr">
+            <a:normAutofit/>
+          </a:bodyPr>
+          <a:lstStyle>
+            <a:lvl1pPr algn="l" defTabSz="914400" rtl="0" eaLnBrk="1" latinLnBrk="0" hangingPunct="1">
+              <a:lnSpc>
+                <a:spcPct val="90000"/>
+              </a:lnSpc>
+              <a:spcBef>
+                <a:spcPct val="0"/>
+              </a:spcBef>
+              <a:buNone/>
+              <a:defRPr sz="4400" kern="1200">
+                <a:solidFill>
+                  <a:schemeClr val="tx1"/>
+                </a:solidFill>
+                <a:latin typeface="+mj-lt"/>
+                <a:ea typeface="+mj-ea"/>
+                <a:cs typeface="+mj-cs"/>
+              </a:defRPr>
+            </a:lvl1pPr>
+          </a:lstStyle>
+          <a:p>
+            <a:r>
+              <a:rPr lang="en-US" dirty="0" smtClean="0"/>
+              <a:t>Getting Help for the NEXT LEVEL</a:t>
+            </a:r>
+            <a:endParaRPr lang="en-US" dirty="0"/>
+          </a:p>
+        </p:txBody>
+      </p:sp>
+    </p:spTree>
+    <p:extLst>
+      <p:ext uri="{BB962C8B-B14F-4D97-AF65-F5344CB8AC3E}">
+        <p14:creationId xmlns:p14="http://schemas.microsoft.com/office/powerpoint/2010/main" val="193045592"/>
       </p:ext>
     </p:extLst>
   </p:cSld>

</xml_diff>

<commit_message>
made final corrections to git slides and programming concepts 1 slides
</commit_message>
<xml_diff>
--- a/2018/misc/CLI Git.pptx
+++ b/2018/misc/CLI Git.pptx
@@ -7,24 +7,25 @@
   <p:sldIdLst>
     <p:sldId id="256" r:id="rId2"/>
     <p:sldId id="257" r:id="rId3"/>
-    <p:sldId id="258" r:id="rId4"/>
-    <p:sldId id="259" r:id="rId5"/>
-    <p:sldId id="261" r:id="rId6"/>
-    <p:sldId id="263" r:id="rId7"/>
-    <p:sldId id="268" r:id="rId8"/>
-    <p:sldId id="282" r:id="rId9"/>
-    <p:sldId id="264" r:id="rId10"/>
-    <p:sldId id="269" r:id="rId11"/>
-    <p:sldId id="271" r:id="rId12"/>
-    <p:sldId id="273" r:id="rId13"/>
-    <p:sldId id="274" r:id="rId14"/>
-    <p:sldId id="272" r:id="rId15"/>
-    <p:sldId id="275" r:id="rId16"/>
-    <p:sldId id="277" r:id="rId17"/>
-    <p:sldId id="283" r:id="rId18"/>
-    <p:sldId id="278" r:id="rId19"/>
-    <p:sldId id="279" r:id="rId20"/>
-    <p:sldId id="281" r:id="rId21"/>
+    <p:sldId id="284" r:id="rId4"/>
+    <p:sldId id="258" r:id="rId5"/>
+    <p:sldId id="259" r:id="rId6"/>
+    <p:sldId id="261" r:id="rId7"/>
+    <p:sldId id="263" r:id="rId8"/>
+    <p:sldId id="268" r:id="rId9"/>
+    <p:sldId id="282" r:id="rId10"/>
+    <p:sldId id="264" r:id="rId11"/>
+    <p:sldId id="269" r:id="rId12"/>
+    <p:sldId id="271" r:id="rId13"/>
+    <p:sldId id="273" r:id="rId14"/>
+    <p:sldId id="274" r:id="rId15"/>
+    <p:sldId id="272" r:id="rId16"/>
+    <p:sldId id="275" r:id="rId17"/>
+    <p:sldId id="277" r:id="rId18"/>
+    <p:sldId id="283" r:id="rId19"/>
+    <p:sldId id="278" r:id="rId20"/>
+    <p:sldId id="279" r:id="rId21"/>
+    <p:sldId id="281" r:id="rId22"/>
   </p:sldIdLst>
   <p:sldSz cx="12192000" cy="6858000"/>
   <p:notesSz cx="6858000" cy="9144000"/>
@@ -3072,6 +3073,13 @@
   <p:clrMapOvr>
     <a:masterClrMapping/>
   </p:clrMapOvr>
+  <p:timing>
+    <p:tnLst>
+      <p:par>
+        <p:cTn id="1" dur="indefinite" restart="never" nodeType="tmRoot"/>
+      </p:par>
+    </p:tnLst>
+  </p:timing>
 </p:sld>
 </file>
 
@@ -3094,52 +3102,143 @@
       </p:grpSpPr>
       <p:sp>
         <p:nvSpPr>
-          <p:cNvPr id="2" name="Title 1"/>
-          <p:cNvSpPr>
-            <a:spLocks noGrp="1"/>
-          </p:cNvSpPr>
-          <p:nvPr>
-            <p:ph type="ctrTitle"/>
-          </p:nvPr>
-        </p:nvSpPr>
-        <p:spPr/>
-        <p:txBody>
-          <a:bodyPr/>
-          <a:lstStyle/>
+          <p:cNvPr id="5" name="Rectangle 4"/>
+          <p:cNvSpPr/>
+          <p:nvPr/>
+        </p:nvSpPr>
+        <p:spPr>
+          <a:xfrm>
+            <a:off x="777210" y="1636296"/>
+            <a:ext cx="10564559" cy="4524315"/>
+          </a:xfrm>
+          <a:prstGeom prst="rect">
+            <a:avLst/>
+          </a:prstGeom>
+        </p:spPr>
+        <p:style>
+          <a:lnRef idx="1">
+            <a:schemeClr val="accent6"/>
+          </a:lnRef>
+          <a:fillRef idx="2">
+            <a:schemeClr val="accent6"/>
+          </a:fillRef>
+          <a:effectRef idx="1">
+            <a:schemeClr val="accent6"/>
+          </a:effectRef>
+          <a:fontRef idx="minor">
+            <a:schemeClr val="dk1"/>
+          </a:fontRef>
+        </p:style>
+        <p:txBody>
+          <a:bodyPr wrap="none">
+            <a:spAutoFit/>
+          </a:bodyPr>
+          <a:lstStyle/>
+          <a:p>
+            <a:r>
+              <a:rPr lang="en-US" sz="3200" dirty="0" smtClean="0"/>
+              <a:t>Learn Code the Hard way</a:t>
+            </a:r>
+            <a:endParaRPr lang="en-US" sz="3200" dirty="0" smtClean="0">
+              <a:hlinkClick r:id="rId2"/>
+            </a:endParaRPr>
+          </a:p>
+          <a:p>
+            <a:r>
+              <a:rPr lang="en-US" sz="3200" dirty="0" smtClean="0">
+                <a:hlinkClick r:id="rId2"/>
+              </a:rPr>
+              <a:t>http://cli.learncodethehardway.org/</a:t>
+            </a:r>
+            <a:endParaRPr lang="en-US" sz="3200" dirty="0" smtClean="0"/>
+          </a:p>
+          <a:p>
+            <a:endParaRPr lang="en-US" sz="3200" dirty="0" smtClean="0"/>
+          </a:p>
+          <a:p>
+            <a:r>
+              <a:rPr lang="en-US" sz="3200" dirty="0" err="1" smtClean="0"/>
+              <a:t>Codecademy</a:t>
+            </a:r>
+            <a:endParaRPr lang="en-US" sz="3200" dirty="0"/>
+          </a:p>
+          <a:p>
+            <a:r>
+              <a:rPr lang="en-US" sz="3200" dirty="0" smtClean="0">
+                <a:hlinkClick r:id="rId3"/>
+              </a:rPr>
+              <a:t>https://www.codecademy.com/learn/learn-the-command-line</a:t>
+            </a:r>
+            <a:endParaRPr lang="en-US" sz="3200" dirty="0" smtClean="0"/>
+          </a:p>
+          <a:p>
+            <a:endParaRPr lang="en-US" sz="3200" dirty="0"/>
+          </a:p>
+          <a:p>
+            <a:r>
+              <a:rPr lang="en-US" sz="3200" dirty="0" smtClean="0"/>
+              <a:t>CLI Quiz</a:t>
+            </a:r>
+          </a:p>
+          <a:p>
+            <a:r>
+              <a:rPr lang="en-US" sz="3200" dirty="0" smtClean="0">
+                <a:hlinkClick r:id="rId4"/>
+              </a:rPr>
+              <a:t>https://github.com/bmw9t/command_line_quiz/</a:t>
+            </a:r>
+            <a:endParaRPr lang="en-US" sz="3200" dirty="0" smtClean="0"/>
+          </a:p>
+          <a:p>
+            <a:endParaRPr lang="en-US" sz="3200" dirty="0" smtClean="0"/>
+          </a:p>
+        </p:txBody>
+      </p:sp>
+      <p:sp>
+        <p:nvSpPr>
+          <p:cNvPr id="7" name="Title 1"/>
+          <p:cNvSpPr txBox="1">
+            <a:spLocks/>
+          </p:cNvSpPr>
+          <p:nvPr/>
+        </p:nvSpPr>
+        <p:spPr>
+          <a:xfrm>
+            <a:off x="2197769" y="-385595"/>
+            <a:ext cx="9144000" cy="2387600"/>
+          </a:xfrm>
+          <a:prstGeom prst="rect">
+            <a:avLst/>
+          </a:prstGeom>
+        </p:spPr>
+        <p:txBody>
+          <a:bodyPr vert="horz" lIns="91440" tIns="45720" rIns="91440" bIns="45720" rtlCol="0" anchor="ctr">
+            <a:normAutofit/>
+          </a:bodyPr>
+          <a:lstStyle>
+            <a:lvl1pPr algn="l" defTabSz="914400" rtl="0" eaLnBrk="1" latinLnBrk="0" hangingPunct="1">
+              <a:lnSpc>
+                <a:spcPct val="90000"/>
+              </a:lnSpc>
+              <a:spcBef>
+                <a:spcPct val="0"/>
+              </a:spcBef>
+              <a:buNone/>
+              <a:defRPr sz="4400" kern="1200">
+                <a:solidFill>
+                  <a:schemeClr val="tx1"/>
+                </a:solidFill>
+                <a:latin typeface="+mj-lt"/>
+                <a:ea typeface="+mj-ea"/>
+                <a:cs typeface="+mj-cs"/>
+              </a:defRPr>
+            </a:lvl1pPr>
+          </a:lstStyle>
           <a:p>
             <a:r>
               <a:rPr lang="en-US" dirty="0" smtClean="0"/>
-              <a:t>Introduction to </a:t>
-            </a:r>
-            <a:r>
-              <a:rPr lang="en-US" dirty="0" err="1" smtClean="0"/>
-              <a:t>Git</a:t>
-            </a:r>
-            <a:endParaRPr lang="en-US" dirty="0"/>
-          </a:p>
-        </p:txBody>
-      </p:sp>
-      <p:sp>
-        <p:nvSpPr>
-          <p:cNvPr id="3" name="Subtitle 2"/>
-          <p:cNvSpPr>
-            <a:spLocks noGrp="1"/>
-          </p:cNvSpPr>
-          <p:nvPr>
-            <p:ph type="subTitle" idx="1"/>
-          </p:nvPr>
-        </p:nvSpPr>
-        <p:spPr/>
-        <p:txBody>
-          <a:bodyPr/>
-          <a:lstStyle/>
-          <a:p>
-            <a:r>
-              <a:rPr lang="en-US" dirty="0" smtClean="0"/>
-              <a:t>HILT 2018</a:t>
-            </a:r>
-          </a:p>
-          <a:p>
+              <a:t>Getting Help for the NEXT LEVEL</a:t>
+            </a:r>
             <a:endParaRPr lang="en-US" dirty="0"/>
           </a:p>
         </p:txBody>
@@ -3147,13 +3246,20 @@
     </p:spTree>
     <p:extLst>
       <p:ext uri="{BB962C8B-B14F-4D97-AF65-F5344CB8AC3E}">
-        <p14:creationId xmlns:p14="http://schemas.microsoft.com/office/powerpoint/2010/main" val="4066827190"/>
+        <p14:creationId xmlns:p14="http://schemas.microsoft.com/office/powerpoint/2010/main" val="923527942"/>
       </p:ext>
     </p:extLst>
   </p:cSld>
   <p:clrMapOvr>
     <a:masterClrMapping/>
   </p:clrMapOvr>
+  <p:timing>
+    <p:tnLst>
+      <p:par>
+        <p:cTn id="1" dur="indefinite" restart="never" nodeType="tmRoot"/>
+      </p:par>
+    </p:tnLst>
+  </p:timing>
 </p:sld>
 </file>
 
@@ -3181,7 +3287,7 @@
             <a:spLocks noGrp="1"/>
           </p:cNvSpPr>
           <p:nvPr>
-            <p:ph type="title"/>
+            <p:ph type="ctrTitle"/>
           </p:nvPr>
         </p:nvSpPr>
         <p:spPr/>
@@ -3189,10 +3295,13 @@
           <a:bodyPr/>
           <a:lstStyle/>
           <a:p>
-            <a:pPr algn="ctr"/>
             <a:r>
               <a:rPr lang="en-US" dirty="0" smtClean="0"/>
-              <a:t>Version Controlling</a:t>
+              <a:t>Introduction to </a:t>
+            </a:r>
+            <a:r>
+              <a:rPr lang="en-US" dirty="0" err="1" smtClean="0"/>
+              <a:t>Git</a:t>
             </a:r>
             <a:endParaRPr lang="en-US" dirty="0"/>
           </a:p>
@@ -3200,59 +3309,46 @@
       </p:sp>
       <p:sp>
         <p:nvSpPr>
-          <p:cNvPr id="3" name="Content Placeholder 2"/>
-          <p:cNvSpPr>
-            <a:spLocks noGrp="1"/>
-          </p:cNvSpPr>
-          <p:nvPr>
-            <p:ph idx="1"/>
+          <p:cNvPr id="3" name="Subtitle 2"/>
+          <p:cNvSpPr>
+            <a:spLocks noGrp="1"/>
+          </p:cNvSpPr>
+          <p:nvPr>
+            <p:ph type="subTitle" idx="1"/>
           </p:nvPr>
         </p:nvSpPr>
         <p:spPr/>
         <p:txBody>
-          <a:bodyPr>
-            <a:normAutofit/>
-          </a:bodyPr>
-          <a:lstStyle/>
-          <a:p>
-            <a:r>
-              <a:rPr lang="en-US" sz="3600" dirty="0" smtClean="0"/>
-              <a:t>Save TONS of different versions of project over time.</a:t>
-            </a:r>
-          </a:p>
-          <a:p>
-            <a:r>
-              <a:rPr lang="en-US" sz="3600" dirty="0" smtClean="0"/>
-              <a:t>Can recover ANY of those iterations.</a:t>
-            </a:r>
-          </a:p>
-          <a:p>
-            <a:r>
-              <a:rPr lang="en-US" sz="3600" dirty="0" smtClean="0"/>
-              <a:t>Nothing is ever lost.</a:t>
-            </a:r>
-          </a:p>
-          <a:p>
-            <a:r>
-              <a:rPr lang="en-US" sz="3600" dirty="0" smtClean="0"/>
-              <a:t>The date, time, and extent of every change is logged (so is the person who made the changes).</a:t>
-            </a:r>
-          </a:p>
-          <a:p>
-            <a:endParaRPr lang="en-US" sz="3600" dirty="0"/>
+          <a:bodyPr/>
+          <a:lstStyle/>
+          <a:p>
+            <a:r>
+              <a:rPr lang="en-US" dirty="0" smtClean="0"/>
+              <a:t>HILT 2018</a:t>
+            </a:r>
+          </a:p>
+          <a:p>
+            <a:endParaRPr lang="en-US" dirty="0"/>
           </a:p>
         </p:txBody>
       </p:sp>
     </p:spTree>
     <p:extLst>
       <p:ext uri="{BB962C8B-B14F-4D97-AF65-F5344CB8AC3E}">
-        <p14:creationId xmlns:p14="http://schemas.microsoft.com/office/powerpoint/2010/main" val="2341958008"/>
+        <p14:creationId xmlns:p14="http://schemas.microsoft.com/office/powerpoint/2010/main" val="4066827190"/>
       </p:ext>
     </p:extLst>
   </p:cSld>
   <p:clrMapOvr>
     <a:masterClrMapping/>
   </p:clrMapOvr>
+  <p:timing>
+    <p:tnLst>
+      <p:par>
+        <p:cTn id="1" dur="indefinite" restart="never" nodeType="tmRoot"/>
+      </p:par>
+    </p:tnLst>
+  </p:timing>
 </p:sld>
 </file>
 
@@ -3273,74 +3369,92 @@
           <a:chExt cx="0" cy="0"/>
         </a:xfrm>
       </p:grpSpPr>
-      <p:pic>
-        <p:nvPicPr>
-          <p:cNvPr id="4" name="Content Placeholder 3"/>
-          <p:cNvPicPr>
-            <a:picLocks noGrp="1" noChangeAspect="1"/>
-          </p:cNvPicPr>
+      <p:sp>
+        <p:nvSpPr>
+          <p:cNvPr id="2" name="Title 1"/>
+          <p:cNvSpPr>
+            <a:spLocks noGrp="1"/>
+          </p:cNvSpPr>
+          <p:nvPr>
+            <p:ph type="title"/>
+          </p:nvPr>
+        </p:nvSpPr>
+        <p:spPr/>
+        <p:txBody>
+          <a:bodyPr/>
+          <a:lstStyle/>
+          <a:p>
+            <a:pPr algn="ctr"/>
+            <a:r>
+              <a:rPr lang="en-US" dirty="0" smtClean="0"/>
+              <a:t>Version Controlling</a:t>
+            </a:r>
+            <a:endParaRPr lang="en-US" dirty="0"/>
+          </a:p>
+        </p:txBody>
+      </p:sp>
+      <p:sp>
+        <p:nvSpPr>
+          <p:cNvPr id="3" name="Content Placeholder 2"/>
+          <p:cNvSpPr>
+            <a:spLocks noGrp="1"/>
+          </p:cNvSpPr>
           <p:nvPr>
             <p:ph idx="1"/>
           </p:nvPr>
-        </p:nvPicPr>
-        <p:blipFill rotWithShape="1">
-          <a:blip r:embed="rId2">
-            <a:extLst>
-              <a:ext uri="{28A0092B-C50C-407E-A947-70E740481C1C}">
-                <a14:useLocalDpi xmlns:a14="http://schemas.microsoft.com/office/drawing/2010/main" val="0"/>
-              </a:ext>
-            </a:extLst>
-          </a:blip>
-          <a:srcRect l="15581" t="12063" r="8680"/>
-          <a:stretch/>
-        </p:blipFill>
-        <p:spPr>
-          <a:xfrm>
-            <a:off x="3206906" y="172681"/>
-            <a:ext cx="7895755" cy="6574383"/>
-          </a:xfrm>
-        </p:spPr>
-      </p:pic>
-      <p:sp>
-        <p:nvSpPr>
-          <p:cNvPr id="2" name="TextBox 1"/>
-          <p:cNvSpPr txBox="1"/>
-          <p:nvPr/>
-        </p:nvSpPr>
-        <p:spPr>
-          <a:xfrm>
-            <a:off x="1505384" y="2422358"/>
-            <a:ext cx="827471" cy="1446550"/>
-          </a:xfrm>
-          <a:prstGeom prst="rect">
-            <a:avLst/>
-          </a:prstGeom>
-          <a:noFill/>
-        </p:spPr>
-        <p:txBody>
-          <a:bodyPr wrap="none" rtlCol="0">
-            <a:spAutoFit/>
+        </p:nvSpPr>
+        <p:spPr/>
+        <p:txBody>
+          <a:bodyPr>
+            <a:normAutofit/>
           </a:bodyPr>
           <a:lstStyle/>
           <a:p>
             <a:r>
-              <a:rPr lang="en-US" sz="8800" dirty="0" smtClean="0"/>
-              <a:t>:(</a:t>
-            </a:r>
-            <a:endParaRPr lang="en-US" sz="8800" dirty="0"/>
+              <a:rPr lang="en-US" sz="3600" dirty="0" smtClean="0"/>
+              <a:t>Save TONS of different versions of project over time.</a:t>
+            </a:r>
+          </a:p>
+          <a:p>
+            <a:r>
+              <a:rPr lang="en-US" sz="3600" dirty="0" smtClean="0"/>
+              <a:t>Can recover ANY of those iterations.</a:t>
+            </a:r>
+          </a:p>
+          <a:p>
+            <a:r>
+              <a:rPr lang="en-US" sz="3600" dirty="0" smtClean="0"/>
+              <a:t>Nothing is ever lost.</a:t>
+            </a:r>
+          </a:p>
+          <a:p>
+            <a:r>
+              <a:rPr lang="en-US" sz="3600" dirty="0" smtClean="0"/>
+              <a:t>The date, time, and extent of every change is logged (so is the person who made the changes).</a:t>
+            </a:r>
+          </a:p>
+          <a:p>
+            <a:endParaRPr lang="en-US" sz="3600" dirty="0"/>
           </a:p>
         </p:txBody>
       </p:sp>
     </p:spTree>
     <p:extLst>
       <p:ext uri="{BB962C8B-B14F-4D97-AF65-F5344CB8AC3E}">
-        <p14:creationId xmlns:p14="http://schemas.microsoft.com/office/powerpoint/2010/main" val="1490363422"/>
+        <p14:creationId xmlns:p14="http://schemas.microsoft.com/office/powerpoint/2010/main" val="2341958008"/>
       </p:ext>
     </p:extLst>
   </p:cSld>
   <p:clrMapOvr>
     <a:masterClrMapping/>
   </p:clrMapOvr>
+  <p:timing>
+    <p:tnLst>
+      <p:par>
+        <p:cTn id="1" dur="indefinite" restart="never" nodeType="tmRoot"/>
+      </p:par>
+    </p:tnLst>
+  </p:timing>
 </p:sld>
 </file>
 
@@ -3371,7 +3485,7 @@
             <p:ph idx="1"/>
           </p:nvPr>
         </p:nvPicPr>
-        <p:blipFill>
+        <p:blipFill rotWithShape="1">
           <a:blip r:embed="rId2">
             <a:extLst>
               <a:ext uri="{28A0092B-C50C-407E-A947-70E740481C1C}">
@@ -3379,20 +3493,19 @@
               </a:ext>
             </a:extLst>
           </a:blip>
-          <a:stretch>
-            <a:fillRect/>
-          </a:stretch>
+          <a:srcRect l="15581" t="12063" r="8680"/>
+          <a:stretch/>
         </p:blipFill>
         <p:spPr>
           <a:xfrm>
-            <a:off x="3704883" y="105182"/>
-            <a:ext cx="6358600" cy="6571663"/>
+            <a:off x="3206906" y="172681"/>
+            <a:ext cx="7895755" cy="6574383"/>
           </a:xfrm>
         </p:spPr>
       </p:pic>
       <p:sp>
         <p:nvSpPr>
-          <p:cNvPr id="3" name="TextBox 2"/>
+          <p:cNvPr id="2" name="TextBox 1"/>
           <p:cNvSpPr txBox="1"/>
           <p:nvPr/>
         </p:nvSpPr>
@@ -3414,7 +3527,7 @@
           <a:p>
             <a:r>
               <a:rPr lang="en-US" sz="8800" dirty="0" smtClean="0"/>
-              <a:t>:)</a:t>
+              <a:t>:(</a:t>
             </a:r>
             <a:endParaRPr lang="en-US" sz="8800" dirty="0"/>
           </a:p>
@@ -3423,13 +3536,20 @@
     </p:spTree>
     <p:extLst>
       <p:ext uri="{BB962C8B-B14F-4D97-AF65-F5344CB8AC3E}">
-        <p14:creationId xmlns:p14="http://schemas.microsoft.com/office/powerpoint/2010/main" val="1151761814"/>
+        <p14:creationId xmlns:p14="http://schemas.microsoft.com/office/powerpoint/2010/main" val="1490363422"/>
       </p:ext>
     </p:extLst>
   </p:cSld>
   <p:clrMapOvr>
     <a:masterClrMapping/>
   </p:clrMapOvr>
+  <p:timing>
+    <p:tnLst>
+      <p:par>
+        <p:cTn id="1" dur="indefinite" restart="never" nodeType="tmRoot"/>
+      </p:par>
+    </p:tnLst>
+  </p:timing>
 </p:sld>
 </file>
 
@@ -3450,85 +3570,82 @@
           <a:chExt cx="0" cy="0"/>
         </a:xfrm>
       </p:grpSpPr>
-      <p:sp>
-        <p:nvSpPr>
-          <p:cNvPr id="2" name="Title 1"/>
-          <p:cNvSpPr>
-            <a:spLocks noGrp="1"/>
-          </p:cNvSpPr>
-          <p:nvPr>
-            <p:ph type="title"/>
-          </p:nvPr>
-        </p:nvSpPr>
-        <p:spPr/>
-        <p:txBody>
-          <a:bodyPr/>
-          <a:lstStyle/>
-          <a:p>
-            <a:pPr algn="ctr"/>
-            <a:r>
-              <a:rPr lang="en-US" dirty="0" err="1" smtClean="0"/>
-              <a:t>Git</a:t>
-            </a:r>
-            <a:endParaRPr lang="en-US" dirty="0"/>
-          </a:p>
-        </p:txBody>
-      </p:sp>
-      <p:sp>
-        <p:nvSpPr>
-          <p:cNvPr id="3" name="Content Placeholder 2"/>
-          <p:cNvSpPr>
-            <a:spLocks noGrp="1"/>
-          </p:cNvSpPr>
+      <p:pic>
+        <p:nvPicPr>
+          <p:cNvPr id="4" name="Content Placeholder 3"/>
+          <p:cNvPicPr>
+            <a:picLocks noGrp="1" noChangeAspect="1"/>
+          </p:cNvPicPr>
           <p:nvPr>
             <p:ph idx="1"/>
           </p:nvPr>
-        </p:nvSpPr>
-        <p:spPr/>
-        <p:txBody>
-          <a:bodyPr>
-            <a:normAutofit/>
+        </p:nvPicPr>
+        <p:blipFill>
+          <a:blip r:embed="rId2">
+            <a:extLst>
+              <a:ext uri="{28A0092B-C50C-407E-A947-70E740481C1C}">
+                <a14:useLocalDpi xmlns:a14="http://schemas.microsoft.com/office/drawing/2010/main" val="0"/>
+              </a:ext>
+            </a:extLst>
+          </a:blip>
+          <a:stretch>
+            <a:fillRect/>
+          </a:stretch>
+        </p:blipFill>
+        <p:spPr>
+          <a:xfrm>
+            <a:off x="3704883" y="105182"/>
+            <a:ext cx="6358600" cy="6571663"/>
+          </a:xfrm>
+        </p:spPr>
+      </p:pic>
+      <p:sp>
+        <p:nvSpPr>
+          <p:cNvPr id="3" name="TextBox 2"/>
+          <p:cNvSpPr txBox="1"/>
+          <p:nvPr/>
+        </p:nvSpPr>
+        <p:spPr>
+          <a:xfrm>
+            <a:off x="1505384" y="2422358"/>
+            <a:ext cx="827471" cy="1446550"/>
+          </a:xfrm>
+          <a:prstGeom prst="rect">
+            <a:avLst/>
+          </a:prstGeom>
+          <a:noFill/>
+        </p:spPr>
+        <p:txBody>
+          <a:bodyPr wrap="none" rtlCol="0">
+            <a:spAutoFit/>
           </a:bodyPr>
           <a:lstStyle/>
           <a:p>
             <a:r>
-              <a:rPr lang="en-US" sz="3600" dirty="0" smtClean="0"/>
-              <a:t>Distributed Version Control System.</a:t>
-            </a:r>
-          </a:p>
-          <a:p>
-            <a:r>
-              <a:rPr lang="en-US" sz="3600" dirty="0" smtClean="0"/>
-              <a:t>Each clone gets the entire project history.</a:t>
-            </a:r>
-          </a:p>
-          <a:p>
-            <a:r>
-              <a:rPr lang="en-US" sz="3600" dirty="0" smtClean="0"/>
-              <a:t>Code exists, in full, everywhere.</a:t>
-            </a:r>
-          </a:p>
-          <a:p>
-            <a:r>
-              <a:rPr lang="en-US" sz="3600" dirty="0" smtClean="0"/>
-              <a:t>Allows easy collaboration via GitHub.</a:t>
-            </a:r>
-          </a:p>
-          <a:p>
-            <a:endParaRPr lang="en-US" sz="3600" dirty="0"/>
+              <a:rPr lang="en-US" sz="8800" dirty="0" smtClean="0"/>
+              <a:t>:)</a:t>
+            </a:r>
+            <a:endParaRPr lang="en-US" sz="8800" dirty="0"/>
           </a:p>
         </p:txBody>
       </p:sp>
     </p:spTree>
     <p:extLst>
       <p:ext uri="{BB962C8B-B14F-4D97-AF65-F5344CB8AC3E}">
-        <p14:creationId xmlns:p14="http://schemas.microsoft.com/office/powerpoint/2010/main" val="2311746495"/>
+        <p14:creationId xmlns:p14="http://schemas.microsoft.com/office/powerpoint/2010/main" val="1151761814"/>
       </p:ext>
     </p:extLst>
   </p:cSld>
   <p:clrMapOvr>
     <a:masterClrMapping/>
   </p:clrMapOvr>
+  <p:timing>
+    <p:tnLst>
+      <p:par>
+        <p:cTn id="1" dur="indefinite" restart="never" nodeType="tmRoot"/>
+      </p:par>
+    </p:tnLst>
+  </p:timing>
 </p:sld>
 </file>
 
@@ -3566,6 +3683,112 @@
           <a:p>
             <a:pPr algn="ctr"/>
             <a:r>
+              <a:rPr lang="en-US" dirty="0" err="1" smtClean="0"/>
+              <a:t>Git</a:t>
+            </a:r>
+            <a:endParaRPr lang="en-US" dirty="0"/>
+          </a:p>
+        </p:txBody>
+      </p:sp>
+      <p:sp>
+        <p:nvSpPr>
+          <p:cNvPr id="3" name="Content Placeholder 2"/>
+          <p:cNvSpPr>
+            <a:spLocks noGrp="1"/>
+          </p:cNvSpPr>
+          <p:nvPr>
+            <p:ph idx="1"/>
+          </p:nvPr>
+        </p:nvSpPr>
+        <p:spPr/>
+        <p:txBody>
+          <a:bodyPr>
+            <a:normAutofit/>
+          </a:bodyPr>
+          <a:lstStyle/>
+          <a:p>
+            <a:r>
+              <a:rPr lang="en-US" sz="3600" dirty="0" smtClean="0"/>
+              <a:t>Distributed Version Control System.</a:t>
+            </a:r>
+          </a:p>
+          <a:p>
+            <a:r>
+              <a:rPr lang="en-US" sz="3600" dirty="0" smtClean="0"/>
+              <a:t>Each clone gets the entire project history.</a:t>
+            </a:r>
+          </a:p>
+          <a:p>
+            <a:r>
+              <a:rPr lang="en-US" sz="3600" dirty="0" smtClean="0"/>
+              <a:t>Code exists, in full, everywhere.</a:t>
+            </a:r>
+          </a:p>
+          <a:p>
+            <a:r>
+              <a:rPr lang="en-US" sz="3600" dirty="0" smtClean="0"/>
+              <a:t>Allows easy collaboration via GitHub.</a:t>
+            </a:r>
+          </a:p>
+          <a:p>
+            <a:endParaRPr lang="en-US" sz="3600" dirty="0"/>
+          </a:p>
+        </p:txBody>
+      </p:sp>
+    </p:spTree>
+    <p:extLst>
+      <p:ext uri="{BB962C8B-B14F-4D97-AF65-F5344CB8AC3E}">
+        <p14:creationId xmlns:p14="http://schemas.microsoft.com/office/powerpoint/2010/main" val="2311746495"/>
+      </p:ext>
+    </p:extLst>
+  </p:cSld>
+  <p:clrMapOvr>
+    <a:masterClrMapping/>
+  </p:clrMapOvr>
+  <p:timing>
+    <p:tnLst>
+      <p:par>
+        <p:cTn id="1" dur="indefinite" restart="never" nodeType="tmRoot"/>
+      </p:par>
+    </p:tnLst>
+  </p:timing>
+</p:sld>
+</file>
+
+<file path=ppt/slides/slide16.xml><?xml version="1.0" encoding="utf-8"?>
+<p:sld xmlns:a="http://schemas.openxmlformats.org/drawingml/2006/main" xmlns:r="http://schemas.openxmlformats.org/officeDocument/2006/relationships" xmlns:p="http://schemas.openxmlformats.org/presentationml/2006/main">
+  <p:cSld>
+    <p:spTree>
+      <p:nvGrpSpPr>
+        <p:cNvPr id="1" name=""/>
+        <p:cNvGrpSpPr/>
+        <p:nvPr/>
+      </p:nvGrpSpPr>
+      <p:grpSpPr>
+        <a:xfrm>
+          <a:off x="0" y="0"/>
+          <a:ext cx="0" cy="0"/>
+          <a:chOff x="0" y="0"/>
+          <a:chExt cx="0" cy="0"/>
+        </a:xfrm>
+      </p:grpSpPr>
+      <p:sp>
+        <p:nvSpPr>
+          <p:cNvPr id="2" name="Title 1"/>
+          <p:cNvSpPr>
+            <a:spLocks noGrp="1"/>
+          </p:cNvSpPr>
+          <p:nvPr>
+            <p:ph type="title"/>
+          </p:nvPr>
+        </p:nvSpPr>
+        <p:spPr/>
+        <p:txBody>
+          <a:bodyPr/>
+          <a:lstStyle/>
+          <a:p>
+            <a:pPr algn="ctr"/>
+            <a:r>
               <a:rPr lang="en-US" dirty="0" smtClean="0"/>
               <a:t>Workflow with Commands</a:t>
             </a:r>
@@ -3700,10 +3923,17 @@
   <p:clrMapOvr>
     <a:masterClrMapping/>
   </p:clrMapOvr>
+  <p:timing>
+    <p:tnLst>
+      <p:par>
+        <p:cTn id="1" dur="indefinite" restart="never" nodeType="tmRoot"/>
+      </p:par>
+    </p:tnLst>
+  </p:timing>
 </p:sld>
 </file>
 
-<file path=ppt/slides/slide16.xml><?xml version="1.0" encoding="utf-8"?>
+<file path=ppt/slides/slide17.xml><?xml version="1.0" encoding="utf-8"?>
 <p:sld xmlns:a="http://schemas.openxmlformats.org/drawingml/2006/main" xmlns:r="http://schemas.openxmlformats.org/officeDocument/2006/relationships" xmlns:p="http://schemas.openxmlformats.org/presentationml/2006/main">
   <p:cSld>
     <p:spTree>
@@ -4121,10 +4351,17 @@
   <p:clrMapOvr>
     <a:masterClrMapping/>
   </p:clrMapOvr>
+  <p:timing>
+    <p:tnLst>
+      <p:par>
+        <p:cTn id="1" dur="indefinite" restart="never" nodeType="tmRoot"/>
+      </p:par>
+    </p:tnLst>
+  </p:timing>
 </p:sld>
 </file>
 
-<file path=ppt/slides/slide17.xml><?xml version="1.0" encoding="utf-8"?>
+<file path=ppt/slides/slide18.xml><?xml version="1.0" encoding="utf-8"?>
 <p:sld xmlns:a="http://schemas.openxmlformats.org/drawingml/2006/main" xmlns:r="http://schemas.openxmlformats.org/officeDocument/2006/relationships" xmlns:p="http://schemas.openxmlformats.org/presentationml/2006/main">
   <p:cSld>
     <p:spTree>
@@ -4180,10 +4417,17 @@
   <p:clrMapOvr>
     <a:masterClrMapping/>
   </p:clrMapOvr>
+  <p:timing>
+    <p:tnLst>
+      <p:par>
+        <p:cTn id="1" dur="indefinite" restart="never" nodeType="tmRoot"/>
+      </p:par>
+    </p:tnLst>
+  </p:timing>
 </p:sld>
 </file>
 
-<file path=ppt/slides/slide18.xml><?xml version="1.0" encoding="utf-8"?>
+<file path=ppt/slides/slide19.xml><?xml version="1.0" encoding="utf-8"?>
 <p:sld xmlns:a="http://schemas.openxmlformats.org/drawingml/2006/main" xmlns:r="http://schemas.openxmlformats.org/officeDocument/2006/relationships" xmlns:p="http://schemas.openxmlformats.org/presentationml/2006/main">
   <p:cSld>
     <p:spTree>
@@ -4288,118 +4532,13 @@
   <p:clrMapOvr>
     <a:masterClrMapping/>
   </p:clrMapOvr>
-</p:sld>
-</file>
-
-<file path=ppt/slides/slide19.xml><?xml version="1.0" encoding="utf-8"?>
-<p:sld xmlns:a="http://schemas.openxmlformats.org/drawingml/2006/main" xmlns:r="http://schemas.openxmlformats.org/officeDocument/2006/relationships" xmlns:p="http://schemas.openxmlformats.org/presentationml/2006/main">
-  <p:cSld>
-    <p:spTree>
-      <p:nvGrpSpPr>
-        <p:cNvPr id="1" name=""/>
-        <p:cNvGrpSpPr/>
-        <p:nvPr/>
-      </p:nvGrpSpPr>
-      <p:grpSpPr>
-        <a:xfrm>
-          <a:off x="0" y="0"/>
-          <a:ext cx="0" cy="0"/>
-          <a:chOff x="0" y="0"/>
-          <a:chExt cx="0" cy="0"/>
-        </a:xfrm>
-      </p:grpSpPr>
-      <p:sp>
-        <p:nvSpPr>
-          <p:cNvPr id="2" name="Title 1"/>
-          <p:cNvSpPr>
-            <a:spLocks noGrp="1"/>
-          </p:cNvSpPr>
-          <p:nvPr>
-            <p:ph type="title"/>
-          </p:nvPr>
-        </p:nvSpPr>
-        <p:spPr>
-          <a:xfrm>
-            <a:off x="7955067" y="549912"/>
-            <a:ext cx="3830129" cy="4620943"/>
-          </a:xfrm>
-        </p:spPr>
-        <p:txBody>
-          <a:bodyPr>
-            <a:normAutofit/>
-          </a:bodyPr>
-          <a:lstStyle/>
-          <a:p>
-            <a:r>
-              <a:rPr lang="en-US" sz="4000" dirty="0" smtClean="0"/>
-              <a:t>The Parallel Universes of </a:t>
-            </a:r>
-            <a:r>
-              <a:rPr lang="en-US" sz="4000" dirty="0" err="1" smtClean="0"/>
-              <a:t>Git</a:t>
-            </a:r>
-            <a:r>
-              <a:rPr lang="en-US" sz="4000" dirty="0" smtClean="0"/>
-              <a:t> Branches &amp; Merges</a:t>
-            </a:r>
-            <a:br>
-              <a:rPr lang="en-US" sz="4000" dirty="0" smtClean="0"/>
-            </a:br>
-            <a:r>
-              <a:rPr lang="en-US" sz="2400" dirty="0"/>
-              <a:t/>
-            </a:r>
-            <a:br>
-              <a:rPr lang="en-US" sz="2400" dirty="0"/>
-            </a:br>
-            <a:r>
-              <a:rPr lang="en-US" sz="2400" dirty="0" smtClean="0"/>
-              <a:t>---as easy as comic book storylines!!</a:t>
-            </a:r>
-            <a:endParaRPr lang="en-US" sz="4000" dirty="0"/>
-          </a:p>
-        </p:txBody>
-      </p:sp>
-      <p:pic>
-        <p:nvPicPr>
-          <p:cNvPr id="3" name="Picture 2"/>
-          <p:cNvPicPr>
-            <a:picLocks noChangeAspect="1"/>
-          </p:cNvPicPr>
-          <p:nvPr/>
-        </p:nvPicPr>
-        <p:blipFill>
-          <a:blip r:embed="rId2">
-            <a:extLst>
-              <a:ext uri="{28A0092B-C50C-407E-A947-70E740481C1C}">
-                <a14:useLocalDpi xmlns:a14="http://schemas.microsoft.com/office/drawing/2010/main" val="0"/>
-              </a:ext>
-            </a:extLst>
-          </a:blip>
-          <a:stretch>
-            <a:fillRect/>
-          </a:stretch>
-        </p:blipFill>
-        <p:spPr>
-          <a:xfrm>
-            <a:off x="174948" y="334638"/>
-            <a:ext cx="7571572" cy="6210539"/>
-          </a:xfrm>
-          <a:prstGeom prst="rect">
-            <a:avLst/>
-          </a:prstGeom>
-        </p:spPr>
-      </p:pic>
-    </p:spTree>
-    <p:extLst>
-      <p:ext uri="{BB962C8B-B14F-4D97-AF65-F5344CB8AC3E}">
-        <p14:creationId xmlns:p14="http://schemas.microsoft.com/office/powerpoint/2010/main" val="2203433950"/>
-      </p:ext>
-    </p:extLst>
-  </p:cSld>
-  <p:clrMapOvr>
-    <a:masterClrMapping/>
-  </p:clrMapOvr>
+  <p:timing>
+    <p:tnLst>
+      <p:par>
+        <p:cTn id="1" dur="indefinite" restart="never" nodeType="tmRoot"/>
+      </p:par>
+    </p:tnLst>
+  </p:timing>
 </p:sld>
 </file>
 
@@ -4544,10 +4683,136 @@
   <p:clrMapOvr>
     <a:masterClrMapping/>
   </p:clrMapOvr>
+  <p:timing>
+    <p:tnLst>
+      <p:par>
+        <p:cTn id="1" dur="indefinite" restart="never" nodeType="tmRoot"/>
+      </p:par>
+    </p:tnLst>
+  </p:timing>
 </p:sld>
 </file>
 
 <file path=ppt/slides/slide20.xml><?xml version="1.0" encoding="utf-8"?>
+<p:sld xmlns:a="http://schemas.openxmlformats.org/drawingml/2006/main" xmlns:r="http://schemas.openxmlformats.org/officeDocument/2006/relationships" xmlns:p="http://schemas.openxmlformats.org/presentationml/2006/main">
+  <p:cSld>
+    <p:spTree>
+      <p:nvGrpSpPr>
+        <p:cNvPr id="1" name=""/>
+        <p:cNvGrpSpPr/>
+        <p:nvPr/>
+      </p:nvGrpSpPr>
+      <p:grpSpPr>
+        <a:xfrm>
+          <a:off x="0" y="0"/>
+          <a:ext cx="0" cy="0"/>
+          <a:chOff x="0" y="0"/>
+          <a:chExt cx="0" cy="0"/>
+        </a:xfrm>
+      </p:grpSpPr>
+      <p:sp>
+        <p:nvSpPr>
+          <p:cNvPr id="2" name="Title 1"/>
+          <p:cNvSpPr>
+            <a:spLocks noGrp="1"/>
+          </p:cNvSpPr>
+          <p:nvPr>
+            <p:ph type="title"/>
+          </p:nvPr>
+        </p:nvSpPr>
+        <p:spPr>
+          <a:xfrm>
+            <a:off x="7955067" y="549912"/>
+            <a:ext cx="3830129" cy="4620943"/>
+          </a:xfrm>
+        </p:spPr>
+        <p:txBody>
+          <a:bodyPr>
+            <a:normAutofit/>
+          </a:bodyPr>
+          <a:lstStyle/>
+          <a:p>
+            <a:r>
+              <a:rPr lang="en-US" sz="4000" dirty="0" smtClean="0"/>
+              <a:t>The Parallel Universes of </a:t>
+            </a:r>
+            <a:r>
+              <a:rPr lang="en-US" sz="4000" dirty="0" err="1" smtClean="0"/>
+              <a:t>Git</a:t>
+            </a:r>
+            <a:r>
+              <a:rPr lang="en-US" sz="4000" dirty="0" smtClean="0"/>
+              <a:t> Branches &amp; Merges</a:t>
+            </a:r>
+            <a:br>
+              <a:rPr lang="en-US" sz="4000" dirty="0" smtClean="0"/>
+            </a:br>
+            <a:r>
+              <a:rPr lang="en-US" sz="2400" dirty="0"/>
+              <a:t/>
+            </a:r>
+            <a:br>
+              <a:rPr lang="en-US" sz="2400" dirty="0"/>
+            </a:br>
+            <a:r>
+              <a:rPr lang="en-US" sz="2400" dirty="0" smtClean="0"/>
+              <a:t>---as easy as comic book storylines!!</a:t>
+            </a:r>
+            <a:endParaRPr lang="en-US" sz="4000" dirty="0"/>
+          </a:p>
+        </p:txBody>
+      </p:sp>
+      <p:pic>
+        <p:nvPicPr>
+          <p:cNvPr id="3" name="Picture 2"/>
+          <p:cNvPicPr>
+            <a:picLocks noChangeAspect="1"/>
+          </p:cNvPicPr>
+          <p:nvPr/>
+        </p:nvPicPr>
+        <p:blipFill>
+          <a:blip r:embed="rId2">
+            <a:extLst>
+              <a:ext uri="{28A0092B-C50C-407E-A947-70E740481C1C}">
+                <a14:useLocalDpi xmlns:a14="http://schemas.microsoft.com/office/drawing/2010/main" val="0"/>
+              </a:ext>
+            </a:extLst>
+          </a:blip>
+          <a:stretch>
+            <a:fillRect/>
+          </a:stretch>
+        </p:blipFill>
+        <p:spPr>
+          <a:xfrm>
+            <a:off x="174948" y="334638"/>
+            <a:ext cx="7571572" cy="6210539"/>
+          </a:xfrm>
+          <a:prstGeom prst="rect">
+            <a:avLst/>
+          </a:prstGeom>
+        </p:spPr>
+      </p:pic>
+    </p:spTree>
+    <p:extLst>
+      <p:ext uri="{BB962C8B-B14F-4D97-AF65-F5344CB8AC3E}">
+        <p14:creationId xmlns:p14="http://schemas.microsoft.com/office/powerpoint/2010/main" val="2203433950"/>
+      </p:ext>
+    </p:extLst>
+  </p:cSld>
+  <p:clrMapOvr>
+    <a:masterClrMapping/>
+  </p:clrMapOvr>
+  <p:timing>
+    <p:tnLst>
+      <p:par>
+        <p:cTn id="1" dur="indefinite" restart="never" nodeType="tmRoot"/>
+      </p:par>
+    </p:tnLst>
+  </p:timing>
+</p:sld>
+</file>
+
+<file path=ppt/slides/slide21.xml><?xml version="1.0" encoding="utf-8"?>
 <p:sld xmlns:a="http://schemas.openxmlformats.org/drawingml/2006/main" xmlns:r="http://schemas.openxmlformats.org/officeDocument/2006/relationships" xmlns:p="http://schemas.openxmlformats.org/presentationml/2006/main">
   <p:cSld>
     <p:spTree>
@@ -4784,10 +5049,83 @@
   <p:clrMapOvr>
     <a:masterClrMapping/>
   </p:clrMapOvr>
+  <p:timing>
+    <p:tnLst>
+      <p:par>
+        <p:cTn id="1" dur="indefinite" restart="never" nodeType="tmRoot"/>
+      </p:par>
+    </p:tnLst>
+  </p:timing>
 </p:sld>
 </file>
 
 <file path=ppt/slides/slide3.xml><?xml version="1.0" encoding="utf-8"?>
+<p:sld xmlns:a="http://schemas.openxmlformats.org/drawingml/2006/main" xmlns:r="http://schemas.openxmlformats.org/officeDocument/2006/relationships" xmlns:p="http://schemas.openxmlformats.org/presentationml/2006/main">
+  <p:cSld>
+    <p:spTree>
+      <p:nvGrpSpPr>
+        <p:cNvPr id="1" name=""/>
+        <p:cNvGrpSpPr/>
+        <p:nvPr/>
+      </p:nvGrpSpPr>
+      <p:grpSpPr>
+        <a:xfrm>
+          <a:off x="0" y="0"/>
+          <a:ext cx="0" cy="0"/>
+          <a:chOff x="0" y="0"/>
+          <a:chExt cx="0" cy="0"/>
+        </a:xfrm>
+      </p:grpSpPr>
+      <p:pic>
+        <p:nvPicPr>
+          <p:cNvPr id="4" name="Content Placeholder 3"/>
+          <p:cNvPicPr>
+            <a:picLocks noGrp="1" noChangeAspect="1"/>
+          </p:cNvPicPr>
+          <p:nvPr>
+            <p:ph idx="1"/>
+          </p:nvPr>
+        </p:nvPicPr>
+        <p:blipFill>
+          <a:blip r:embed="rId2">
+            <a:extLst>
+              <a:ext uri="{28A0092B-C50C-407E-A947-70E740481C1C}">
+                <a14:useLocalDpi xmlns:a14="http://schemas.microsoft.com/office/drawing/2010/main" val="0"/>
+              </a:ext>
+            </a:extLst>
+          </a:blip>
+          <a:stretch>
+            <a:fillRect/>
+          </a:stretch>
+        </p:blipFill>
+        <p:spPr>
+          <a:xfrm>
+            <a:off x="2263553" y="882316"/>
+            <a:ext cx="6903508" cy="5177631"/>
+          </a:xfrm>
+        </p:spPr>
+      </p:pic>
+    </p:spTree>
+    <p:extLst>
+      <p:ext uri="{BB962C8B-B14F-4D97-AF65-F5344CB8AC3E}">
+        <p14:creationId xmlns:p14="http://schemas.microsoft.com/office/powerpoint/2010/main" val="573961226"/>
+      </p:ext>
+    </p:extLst>
+  </p:cSld>
+  <p:clrMapOvr>
+    <a:masterClrMapping/>
+  </p:clrMapOvr>
+  <p:timing>
+    <p:tnLst>
+      <p:par>
+        <p:cTn id="1" dur="indefinite" restart="never" nodeType="tmRoot"/>
+      </p:par>
+    </p:tnLst>
+  </p:timing>
+</p:sld>
+</file>
+
+<file path=ppt/slides/slide4.xml><?xml version="1.0" encoding="utf-8"?>
 <p:sld xmlns:a="http://schemas.openxmlformats.org/drawingml/2006/main" xmlns:r="http://schemas.openxmlformats.org/officeDocument/2006/relationships" xmlns:p="http://schemas.openxmlformats.org/presentationml/2006/main">
   <p:cSld>
     <p:spTree>
@@ -4934,10 +5272,17 @@
   <p:clrMapOvr>
     <a:masterClrMapping/>
   </p:clrMapOvr>
+  <p:timing>
+    <p:tnLst>
+      <p:par>
+        <p:cTn id="1" dur="indefinite" restart="never" nodeType="tmRoot"/>
+      </p:par>
+    </p:tnLst>
+  </p:timing>
 </p:sld>
 </file>
 
-<file path=ppt/slides/slide4.xml><?xml version="1.0" encoding="utf-8"?>
+<file path=ppt/slides/slide5.xml><?xml version="1.0" encoding="utf-8"?>
 <p:sld xmlns:a="http://schemas.openxmlformats.org/drawingml/2006/main" xmlns:r="http://schemas.openxmlformats.org/officeDocument/2006/relationships" xmlns:p="http://schemas.openxmlformats.org/presentationml/2006/main">
   <p:cSld>
     <p:spTree>
@@ -5024,10 +5369,17 @@
   <p:clrMapOvr>
     <a:masterClrMapping/>
   </p:clrMapOvr>
+  <p:timing>
+    <p:tnLst>
+      <p:par>
+        <p:cTn id="1" dur="indefinite" restart="never" nodeType="tmRoot"/>
+      </p:par>
+    </p:tnLst>
+  </p:timing>
 </p:sld>
 </file>
 
-<file path=ppt/slides/slide5.xml><?xml version="1.0" encoding="utf-8"?>
+<file path=ppt/slides/slide6.xml><?xml version="1.0" encoding="utf-8"?>
 <p:sld xmlns:a="http://schemas.openxmlformats.org/drawingml/2006/main" xmlns:r="http://schemas.openxmlformats.org/officeDocument/2006/relationships" xmlns:p="http://schemas.openxmlformats.org/presentationml/2006/main">
   <p:cSld>
     <p:spTree>
@@ -5121,10 +5473,17 @@
   <p:clrMapOvr>
     <a:masterClrMapping/>
   </p:clrMapOvr>
+  <p:timing>
+    <p:tnLst>
+      <p:par>
+        <p:cTn id="1" dur="indefinite" restart="never" nodeType="tmRoot"/>
+      </p:par>
+    </p:tnLst>
+  </p:timing>
 </p:sld>
 </file>
 
-<file path=ppt/slides/slide6.xml><?xml version="1.0" encoding="utf-8"?>
+<file path=ppt/slides/slide7.xml><?xml version="1.0" encoding="utf-8"?>
 <p:sld xmlns:a="http://schemas.openxmlformats.org/drawingml/2006/main" xmlns:r="http://schemas.openxmlformats.org/officeDocument/2006/relationships" xmlns:p="http://schemas.openxmlformats.org/presentationml/2006/main">
   <p:cSld>
     <p:spTree>
@@ -5864,10 +6223,17 @@
   <p:clrMapOvr>
     <a:masterClrMapping/>
   </p:clrMapOvr>
+  <p:timing>
+    <p:tnLst>
+      <p:par>
+        <p:cTn id="1" dur="indefinite" restart="never" nodeType="tmRoot"/>
+      </p:par>
+    </p:tnLst>
+  </p:timing>
 </p:sld>
 </file>
 
-<file path=ppt/slides/slide7.xml><?xml version="1.0" encoding="utf-8"?>
+<file path=ppt/slides/slide8.xml><?xml version="1.0" encoding="utf-8"?>
 <p:sld xmlns:a="http://schemas.openxmlformats.org/drawingml/2006/main" xmlns:r="http://schemas.openxmlformats.org/officeDocument/2006/relationships" xmlns:p="http://schemas.openxmlformats.org/presentationml/2006/main">
   <p:cSld>
     <p:spTree>
@@ -5967,10 +6333,17 @@
   <p:clrMapOvr>
     <a:masterClrMapping/>
   </p:clrMapOvr>
+  <p:timing>
+    <p:tnLst>
+      <p:par>
+        <p:cTn id="1" dur="indefinite" restart="never" nodeType="tmRoot"/>
+      </p:par>
+    </p:tnLst>
+  </p:timing>
 </p:sld>
 </file>
 
-<file path=ppt/slides/slide8.xml><?xml version="1.0" encoding="utf-8"?>
+<file path=ppt/slides/slide9.xml><?xml version="1.0" encoding="utf-8"?>
 <p:sld xmlns:a="http://schemas.openxmlformats.org/drawingml/2006/main" xmlns:r="http://schemas.openxmlformats.org/officeDocument/2006/relationships" xmlns:p="http://schemas.openxmlformats.org/presentationml/2006/main">
   <p:cSld>
     <p:spTree>
@@ -6076,179 +6449,13 @@
   <p:clrMapOvr>
     <a:masterClrMapping/>
   </p:clrMapOvr>
-</p:sld>
-</file>
-
-<file path=ppt/slides/slide9.xml><?xml version="1.0" encoding="utf-8"?>
-<p:sld xmlns:a="http://schemas.openxmlformats.org/drawingml/2006/main" xmlns:r="http://schemas.openxmlformats.org/officeDocument/2006/relationships" xmlns:p="http://schemas.openxmlformats.org/presentationml/2006/main">
-  <p:cSld>
-    <p:spTree>
-      <p:nvGrpSpPr>
-        <p:cNvPr id="1" name=""/>
-        <p:cNvGrpSpPr/>
-        <p:nvPr/>
-      </p:nvGrpSpPr>
-      <p:grpSpPr>
-        <a:xfrm>
-          <a:off x="0" y="0"/>
-          <a:ext cx="0" cy="0"/>
-          <a:chOff x="0" y="0"/>
-          <a:chExt cx="0" cy="0"/>
-        </a:xfrm>
-      </p:grpSpPr>
-      <p:sp>
-        <p:nvSpPr>
-          <p:cNvPr id="5" name="Rectangle 4"/>
-          <p:cNvSpPr/>
-          <p:nvPr/>
-        </p:nvSpPr>
-        <p:spPr>
-          <a:xfrm>
-            <a:off x="777210" y="1636296"/>
-            <a:ext cx="10564559" cy="4524315"/>
-          </a:xfrm>
-          <a:prstGeom prst="rect">
-            <a:avLst/>
-          </a:prstGeom>
-        </p:spPr>
-        <p:style>
-          <a:lnRef idx="1">
-            <a:schemeClr val="accent6"/>
-          </a:lnRef>
-          <a:fillRef idx="2">
-            <a:schemeClr val="accent6"/>
-          </a:fillRef>
-          <a:effectRef idx="1">
-            <a:schemeClr val="accent6"/>
-          </a:effectRef>
-          <a:fontRef idx="minor">
-            <a:schemeClr val="dk1"/>
-          </a:fontRef>
-        </p:style>
-        <p:txBody>
-          <a:bodyPr wrap="none">
-            <a:spAutoFit/>
-          </a:bodyPr>
-          <a:lstStyle/>
-          <a:p>
-            <a:r>
-              <a:rPr lang="en-US" sz="3200" dirty="0" smtClean="0"/>
-              <a:t>Learn Code the Hard way</a:t>
-            </a:r>
-            <a:endParaRPr lang="en-US" sz="3200" dirty="0" smtClean="0">
-              <a:hlinkClick r:id="rId2"/>
-            </a:endParaRPr>
-          </a:p>
-          <a:p>
-            <a:r>
-              <a:rPr lang="en-US" sz="3200" dirty="0" smtClean="0">
-                <a:hlinkClick r:id="rId2"/>
-              </a:rPr>
-              <a:t>http://cli.learncodethehardway.org/</a:t>
-            </a:r>
-            <a:endParaRPr lang="en-US" sz="3200" dirty="0" smtClean="0"/>
-          </a:p>
-          <a:p>
-            <a:endParaRPr lang="en-US" sz="3200" dirty="0" smtClean="0"/>
-          </a:p>
-          <a:p>
-            <a:r>
-              <a:rPr lang="en-US" sz="3200" dirty="0" err="1" smtClean="0"/>
-              <a:t>Codecademy</a:t>
-            </a:r>
-            <a:endParaRPr lang="en-US" sz="3200" dirty="0"/>
-          </a:p>
-          <a:p>
-            <a:r>
-              <a:rPr lang="en-US" sz="3200" dirty="0" smtClean="0">
-                <a:hlinkClick r:id="rId3"/>
-              </a:rPr>
-              <a:t>https://www.codecademy.com/learn/learn-the-command-line</a:t>
-            </a:r>
-            <a:endParaRPr lang="en-US" sz="3200" dirty="0" smtClean="0"/>
-          </a:p>
-          <a:p>
-            <a:endParaRPr lang="en-US" sz="3200" dirty="0"/>
-          </a:p>
-          <a:p>
-            <a:r>
-              <a:rPr lang="en-US" sz="3200" dirty="0" smtClean="0"/>
-              <a:t>CLI Quiz</a:t>
-            </a:r>
-          </a:p>
-          <a:p>
-            <a:r>
-              <a:rPr lang="en-US" sz="3200" dirty="0" smtClean="0">
-                <a:hlinkClick r:id="rId4"/>
-              </a:rPr>
-              <a:t>https://github.com/bmw9t/command_line_quiz/</a:t>
-            </a:r>
-            <a:endParaRPr lang="en-US" sz="3200" dirty="0" smtClean="0"/>
-          </a:p>
-          <a:p>
-            <a:endParaRPr lang="en-US" sz="3200" dirty="0" smtClean="0"/>
-          </a:p>
-        </p:txBody>
-      </p:sp>
-      <p:sp>
-        <p:nvSpPr>
-          <p:cNvPr id="7" name="Title 1"/>
-          <p:cNvSpPr txBox="1">
-            <a:spLocks/>
-          </p:cNvSpPr>
-          <p:nvPr/>
-        </p:nvSpPr>
-        <p:spPr>
-          <a:xfrm>
-            <a:off x="2197769" y="-385595"/>
-            <a:ext cx="9144000" cy="2387600"/>
-          </a:xfrm>
-          <a:prstGeom prst="rect">
-            <a:avLst/>
-          </a:prstGeom>
-        </p:spPr>
-        <p:txBody>
-          <a:bodyPr vert="horz" lIns="91440" tIns="45720" rIns="91440" bIns="45720" rtlCol="0" anchor="ctr">
-            <a:normAutofit/>
-          </a:bodyPr>
-          <a:lstStyle>
-            <a:lvl1pPr algn="l" defTabSz="914400" rtl="0" eaLnBrk="1" latinLnBrk="0" hangingPunct="1">
-              <a:lnSpc>
-                <a:spcPct val="90000"/>
-              </a:lnSpc>
-              <a:spcBef>
-                <a:spcPct val="0"/>
-              </a:spcBef>
-              <a:buNone/>
-              <a:defRPr sz="4400" kern="1200">
-                <a:solidFill>
-                  <a:schemeClr val="tx1"/>
-                </a:solidFill>
-                <a:latin typeface="+mj-lt"/>
-                <a:ea typeface="+mj-ea"/>
-                <a:cs typeface="+mj-cs"/>
-              </a:defRPr>
-            </a:lvl1pPr>
-          </a:lstStyle>
-          <a:p>
-            <a:r>
-              <a:rPr lang="en-US" dirty="0" smtClean="0"/>
-              <a:t>Getting Help for the NEXT LEVEL</a:t>
-            </a:r>
-            <a:endParaRPr lang="en-US" dirty="0"/>
-          </a:p>
-        </p:txBody>
-      </p:sp>
-    </p:spTree>
-    <p:extLst>
-      <p:ext uri="{BB962C8B-B14F-4D97-AF65-F5344CB8AC3E}">
-        <p14:creationId xmlns:p14="http://schemas.microsoft.com/office/powerpoint/2010/main" val="923527942"/>
-      </p:ext>
-    </p:extLst>
-  </p:cSld>
-  <p:clrMapOvr>
-    <a:masterClrMapping/>
-  </p:clrMapOvr>
+  <p:timing>
+    <p:tnLst>
+      <p:par>
+        <p:cTn id="1" dur="indefinite" restart="never" nodeType="tmRoot"/>
+      </p:par>
+    </p:tnLst>
+  </p:timing>
 </p:sld>
 </file>
 

</xml_diff>